<commit_message>
Präsentation vervollständigt und pdf erstellt.
</commit_message>
<xml_diff>
--- a/3-Implementierung/0-Ressourcen/2019-07-25 - Zwischenstandsbesprechung/2019-07-25-Zwischenstand-GUI.pptx
+++ b/3-Implementierung/0-Ressourcen/2019-07-25 - Zwischenstandsbesprechung/2019-07-25-Zwischenstand-GUI.pptx
@@ -8,10 +8,10 @@
     <p:notesMasterId r:id="rId6"/>
   </p:notesMasterIdLst>
   <p:sldIdLst>
-    <p:sldId id="256" r:id="rId2"/>
-    <p:sldId id="258" r:id="rId3"/>
-    <p:sldId id="259" r:id="rId4"/>
-    <p:sldId id="260" r:id="rId5"/>
+    <p:sldId id="258" r:id="rId2"/>
+    <p:sldId id="261" r:id="rId3"/>
+    <p:sldId id="262" r:id="rId4"/>
+    <p:sldId id="263" r:id="rId5"/>
   </p:sldIdLst>
   <p:sldSz cx="12192000" cy="6858000"/>
   <p:notesSz cx="6858000" cy="9144000"/>
@@ -110,6 +110,14 @@
       </a:defRPr>
     </a:lvl9pPr>
   </p:defaultTextStyle>
+  <p:extLst>
+    <p:ext uri="{EFAFB233-063F-42B5-8137-9DF3F51BA10A}">
+      <p15:sldGuideLst xmlns:p15="http://schemas.microsoft.com/office/powerpoint/2012/main"/>
+    </p:ext>
+    <p:ext uri="{2D200454-40CA-4A62-9FC3-DE9A4176ACB9}">
+      <p15:notesGuideLst xmlns:p15="http://schemas.microsoft.com/office/powerpoint/2012/main"/>
+    </p:ext>
+  </p:extLst>
 </p:presentation>
 </file>
 
@@ -3730,10 +3738,10 @@
       </p:sp>
       <p:sp>
         <p:nvSpPr>
-          <p:cNvPr id="5" name="Rechteck 4">
-            <a:extLst>
-              <a:ext uri="{FF2B5EF4-FFF2-40B4-BE49-F238E27FC236}">
-                <a16:creationId xmlns:a16="http://schemas.microsoft.com/office/drawing/2014/main" id="{F8D33603-EE5F-46B7-8B5E-60A82565FB28}"/>
+          <p:cNvPr id="10" name="Rechteck 9">
+            <a:extLst>
+              <a:ext uri="{FF2B5EF4-FFF2-40B4-BE49-F238E27FC236}">
+                <a16:creationId xmlns:a16="http://schemas.microsoft.com/office/drawing/2014/main" id="{AF59AB75-2FF6-43AC-A90F-ECC41C949285}"/>
               </a:ext>
             </a:extLst>
           </p:cNvPr>
@@ -3742,306 +3750,14 @@
         </p:nvSpPr>
         <p:spPr>
           <a:xfrm>
-            <a:off x="0" y="6122126"/>
-            <a:ext cx="4171406" cy="735874"/>
+            <a:off x="1" y="0"/>
+            <a:ext cx="6474819" cy="6122127"/>
           </a:xfrm>
           <a:prstGeom prst="rect">
             <a:avLst/>
           </a:prstGeom>
           <a:solidFill>
-            <a:schemeClr val="bg1">
-              <a:lumMod val="85000"/>
-            </a:schemeClr>
-          </a:solidFill>
-          <a:ln w="31750">
-            <a:solidFill>
-              <a:schemeClr val="bg1">
-                <a:lumMod val="50000"/>
-              </a:schemeClr>
-            </a:solidFill>
-          </a:ln>
-        </p:spPr>
-        <p:style>
-          <a:lnRef idx="2">
-            <a:schemeClr val="accent1">
-              <a:shade val="50000"/>
-            </a:schemeClr>
-          </a:lnRef>
-          <a:fillRef idx="1">
-            <a:schemeClr val="accent1"/>
-          </a:fillRef>
-          <a:effectRef idx="0">
-            <a:schemeClr val="accent1"/>
-          </a:effectRef>
-          <a:fontRef idx="minor">
-            <a:schemeClr val="lt1"/>
-          </a:fontRef>
-        </p:style>
-        <p:txBody>
-          <a:bodyPr rtlCol="0" anchor="ctr"/>
-          <a:lstStyle/>
-          <a:p>
-            <a:pPr algn="ctr"/>
-            <a:r>
-              <a:rPr lang="en-US" sz="2000" dirty="0" err="1">
-                <a:solidFill>
-                  <a:schemeClr val="tx1"/>
-                </a:solidFill>
-              </a:rPr>
-              <a:t>Hauptfenster</a:t>
-            </a:r>
-            <a:endParaRPr lang="de-DE" dirty="0">
-              <a:solidFill>
-                <a:schemeClr val="tx1"/>
-              </a:solidFill>
-            </a:endParaRPr>
-          </a:p>
-        </p:txBody>
-      </p:sp>
-      <p:sp>
-        <p:nvSpPr>
-          <p:cNvPr id="6" name="Rechteck 5">
-            <a:extLst>
-              <a:ext uri="{FF2B5EF4-FFF2-40B4-BE49-F238E27FC236}">
-                <a16:creationId xmlns:a16="http://schemas.microsoft.com/office/drawing/2014/main" id="{BB0B3755-5F21-48E5-988A-183FA40BE993}"/>
-              </a:ext>
-            </a:extLst>
-          </p:cNvPr>
-          <p:cNvSpPr/>
-          <p:nvPr/>
-        </p:nvSpPr>
-        <p:spPr>
-          <a:xfrm>
-            <a:off x="4171406" y="6122126"/>
-            <a:ext cx="4119154" cy="735874"/>
-          </a:xfrm>
-          <a:prstGeom prst="rect">
-            <a:avLst/>
-          </a:prstGeom>
-          <a:solidFill>
-            <a:schemeClr val="bg1">
-              <a:lumMod val="85000"/>
-            </a:schemeClr>
-          </a:solidFill>
-          <a:ln w="31750">
-            <a:solidFill>
-              <a:schemeClr val="bg1">
-                <a:lumMod val="50000"/>
-              </a:schemeClr>
-            </a:solidFill>
-          </a:ln>
-        </p:spPr>
-        <p:style>
-          <a:lnRef idx="2">
-            <a:schemeClr val="accent1">
-              <a:shade val="50000"/>
-            </a:schemeClr>
-          </a:lnRef>
-          <a:fillRef idx="1">
-            <a:schemeClr val="accent1"/>
-          </a:fillRef>
-          <a:effectRef idx="0">
-            <a:schemeClr val="accent1"/>
-          </a:effectRef>
-          <a:fontRef idx="minor">
-            <a:schemeClr val="lt1"/>
-          </a:fontRef>
-        </p:style>
-        <p:txBody>
-          <a:bodyPr rtlCol="0" anchor="ctr"/>
-          <a:lstStyle/>
-          <a:p>
-            <a:pPr algn="ctr"/>
-            <a:r>
-              <a:rPr lang="en-US" sz="2000" dirty="0" err="1">
-                <a:solidFill>
-                  <a:schemeClr val="tx1"/>
-                </a:solidFill>
-              </a:rPr>
-              <a:t>Configurationsfeld</a:t>
-            </a:r>
-            <a:endParaRPr lang="de-DE" dirty="0">
-              <a:solidFill>
-                <a:schemeClr val="tx1"/>
-              </a:solidFill>
-            </a:endParaRPr>
-          </a:p>
-        </p:txBody>
-      </p:sp>
-      <p:sp>
-        <p:nvSpPr>
-          <p:cNvPr id="7" name="Rechteck 6">
-            <a:extLst>
-              <a:ext uri="{FF2B5EF4-FFF2-40B4-BE49-F238E27FC236}">
-                <a16:creationId xmlns:a16="http://schemas.microsoft.com/office/drawing/2014/main" id="{62C82B8B-BE55-4729-B09E-417C0AE0DE93}"/>
-              </a:ext>
-            </a:extLst>
-          </p:cNvPr>
-          <p:cNvSpPr/>
-          <p:nvPr/>
-        </p:nvSpPr>
-        <p:spPr>
-          <a:xfrm>
-            <a:off x="8290560" y="6122126"/>
-            <a:ext cx="3901440" cy="735874"/>
-          </a:xfrm>
-          <a:prstGeom prst="rect">
-            <a:avLst/>
-          </a:prstGeom>
-          <a:solidFill>
-            <a:schemeClr val="bg1">
-              <a:lumMod val="85000"/>
-            </a:schemeClr>
-          </a:solidFill>
-          <a:ln w="31750">
-            <a:solidFill>
-              <a:schemeClr val="bg1">
-                <a:lumMod val="50000"/>
-              </a:schemeClr>
-            </a:solidFill>
-          </a:ln>
-        </p:spPr>
-        <p:style>
-          <a:lnRef idx="2">
-            <a:schemeClr val="accent1">
-              <a:shade val="50000"/>
-            </a:schemeClr>
-          </a:lnRef>
-          <a:fillRef idx="1">
-            <a:schemeClr val="accent1"/>
-          </a:fillRef>
-          <a:effectRef idx="0">
-            <a:schemeClr val="accent1"/>
-          </a:effectRef>
-          <a:fontRef idx="minor">
-            <a:schemeClr val="lt1"/>
-          </a:fontRef>
-        </p:style>
-        <p:txBody>
-          <a:bodyPr rtlCol="0" anchor="ctr"/>
-          <a:lstStyle/>
-          <a:p>
-            <a:pPr algn="ctr"/>
-            <a:r>
-              <a:rPr lang="en-US" sz="2000" dirty="0">
-                <a:solidFill>
-                  <a:schemeClr val="tx1"/>
-                </a:solidFill>
-              </a:rPr>
-              <a:t>Editor </a:t>
-            </a:r>
-            <a:r>
-              <a:rPr lang="en-US" sz="2000" dirty="0" err="1">
-                <a:solidFill>
-                  <a:schemeClr val="tx1"/>
-                </a:solidFill>
-              </a:rPr>
-              <a:t>für</a:t>
-            </a:r>
-            <a:r>
-              <a:rPr lang="en-US" sz="2000" dirty="0">
-                <a:solidFill>
-                  <a:schemeClr val="tx1"/>
-                </a:solidFill>
-              </a:rPr>
-              <a:t> </a:t>
-            </a:r>
-            <a:r>
-              <a:rPr lang="en-US" sz="2000" dirty="0" err="1">
-                <a:solidFill>
-                  <a:schemeClr val="tx1"/>
-                </a:solidFill>
-              </a:rPr>
-              <a:t>Konfigurationen</a:t>
-            </a:r>
-            <a:endParaRPr lang="de-DE" dirty="0">
-              <a:solidFill>
-                <a:schemeClr val="tx1"/>
-              </a:solidFill>
-            </a:endParaRPr>
-          </a:p>
-        </p:txBody>
-      </p:sp>
-      <p:sp>
-        <p:nvSpPr>
-          <p:cNvPr id="9" name="Rechteck 8">
-            <a:extLst>
-              <a:ext uri="{FF2B5EF4-FFF2-40B4-BE49-F238E27FC236}">
-                <a16:creationId xmlns:a16="http://schemas.microsoft.com/office/drawing/2014/main" id="{81AF1F01-DE57-4926-B2A4-A4CCC4CDB337}"/>
-              </a:ext>
-            </a:extLst>
-          </p:cNvPr>
-          <p:cNvSpPr/>
-          <p:nvPr/>
-        </p:nvSpPr>
-        <p:spPr>
-          <a:xfrm>
-            <a:off x="-209005" y="6104714"/>
-            <a:ext cx="12540343" cy="1193067"/>
-          </a:xfrm>
-          <a:prstGeom prst="rect">
-            <a:avLst/>
-          </a:prstGeom>
-          <a:solidFill>
-            <a:schemeClr val="bg1">
-              <a:alpha val="80000"/>
-            </a:schemeClr>
-          </a:solidFill>
-          <a:ln w="31750">
-            <a:noFill/>
-          </a:ln>
-        </p:spPr>
-        <p:style>
-          <a:lnRef idx="2">
-            <a:schemeClr val="accent1">
-              <a:shade val="50000"/>
-            </a:schemeClr>
-          </a:lnRef>
-          <a:fillRef idx="1">
-            <a:schemeClr val="accent1"/>
-          </a:fillRef>
-          <a:effectRef idx="0">
-            <a:schemeClr val="accent1"/>
-          </a:effectRef>
-          <a:fontRef idx="minor">
-            <a:schemeClr val="lt1"/>
-          </a:fontRef>
-        </p:style>
-        <p:txBody>
-          <a:bodyPr rtlCol="0" anchor="ctr"/>
-          <a:lstStyle/>
-          <a:p>
-            <a:pPr algn="ctr"/>
-            <a:endParaRPr lang="de-DE" dirty="0">
-              <a:solidFill>
-                <a:schemeClr val="tx1"/>
-              </a:solidFill>
-            </a:endParaRPr>
-          </a:p>
-        </p:txBody>
-      </p:sp>
-      <p:sp>
-        <p:nvSpPr>
-          <p:cNvPr id="10" name="Rechteck 9">
-            <a:extLst>
-              <a:ext uri="{FF2B5EF4-FFF2-40B4-BE49-F238E27FC236}">
-                <a16:creationId xmlns:a16="http://schemas.microsoft.com/office/drawing/2014/main" id="{AF59AB75-2FF6-43AC-A90F-ECC41C949285}"/>
-              </a:ext>
-            </a:extLst>
-          </p:cNvPr>
-          <p:cNvSpPr/>
-          <p:nvPr/>
-        </p:nvSpPr>
-        <p:spPr>
-          <a:xfrm>
-            <a:off x="1" y="0"/>
-            <a:ext cx="12183291" cy="6122127"/>
-          </a:xfrm>
-          <a:prstGeom prst="rect">
-            <a:avLst/>
-          </a:prstGeom>
-          <a:solidFill>
-            <a:srgbClr val="00B0F0"/>
+            <a:srgbClr val="0070C0"/>
           </a:solidFill>
           <a:ln w="31750">
             <a:noFill/>
@@ -4154,6 +3870,307 @@
           </a:p>
         </p:txBody>
       </p:sp>
+      <p:grpSp>
+        <p:nvGrpSpPr>
+          <p:cNvPr id="40" name="Gruppieren 39">
+            <a:extLst>
+              <a:ext uri="{FF2B5EF4-FFF2-40B4-BE49-F238E27FC236}">
+                <a16:creationId xmlns:a16="http://schemas.microsoft.com/office/drawing/2014/main" id="{ABAC8830-0EBF-45E9-B672-2A0FE3F3A3D6}"/>
+              </a:ext>
+            </a:extLst>
+          </p:cNvPr>
+          <p:cNvGrpSpPr/>
+          <p:nvPr/>
+        </p:nvGrpSpPr>
+        <p:grpSpPr>
+          <a:xfrm>
+            <a:off x="1" y="6116680"/>
+            <a:ext cx="12176753" cy="756561"/>
+            <a:chOff x="1" y="6116680"/>
+            <a:chExt cx="12176753" cy="756561"/>
+          </a:xfrm>
+        </p:grpSpPr>
+        <p:sp>
+          <p:nvSpPr>
+            <p:cNvPr id="5" name="Rechteck 4">
+              <a:extLst>
+                <a:ext uri="{FF2B5EF4-FFF2-40B4-BE49-F238E27FC236}">
+                  <a16:creationId xmlns:a16="http://schemas.microsoft.com/office/drawing/2014/main" id="{F8D33603-EE5F-46B7-8B5E-60A82565FB28}"/>
+                </a:ext>
+              </a:extLst>
+            </p:cNvPr>
+            <p:cNvSpPr/>
+            <p:nvPr/>
+          </p:nvSpPr>
+          <p:spPr>
+            <a:xfrm>
+              <a:off x="1" y="6122126"/>
+              <a:ext cx="1976846" cy="735874"/>
+            </a:xfrm>
+            <a:prstGeom prst="rect">
+              <a:avLst/>
+            </a:prstGeom>
+            <a:solidFill>
+              <a:schemeClr val="bg1">
+                <a:lumMod val="85000"/>
+              </a:schemeClr>
+            </a:solidFill>
+            <a:ln w="31750">
+              <a:solidFill>
+                <a:schemeClr val="bg1">
+                  <a:lumMod val="50000"/>
+                </a:schemeClr>
+              </a:solidFill>
+            </a:ln>
+          </p:spPr>
+          <p:style>
+            <a:lnRef idx="2">
+              <a:schemeClr val="accent1">
+                <a:shade val="50000"/>
+              </a:schemeClr>
+            </a:lnRef>
+            <a:fillRef idx="1">
+              <a:schemeClr val="accent1"/>
+            </a:fillRef>
+            <a:effectRef idx="0">
+              <a:schemeClr val="accent1"/>
+            </a:effectRef>
+            <a:fontRef idx="minor">
+              <a:schemeClr val="lt1"/>
+            </a:fontRef>
+          </p:style>
+          <p:txBody>
+            <a:bodyPr rtlCol="0" anchor="ctr"/>
+            <a:lstStyle/>
+            <a:p>
+              <a:pPr algn="ctr"/>
+              <a:r>
+                <a:rPr lang="en-US" sz="2000" dirty="0" err="1">
+                  <a:solidFill>
+                    <a:schemeClr val="tx1"/>
+                  </a:solidFill>
+                </a:rPr>
+                <a:t>Hauptfenster</a:t>
+              </a:r>
+              <a:endParaRPr lang="de-DE" dirty="0">
+                <a:solidFill>
+                  <a:schemeClr val="tx1"/>
+                </a:solidFill>
+              </a:endParaRPr>
+            </a:p>
+          </p:txBody>
+        </p:sp>
+        <p:sp>
+          <p:nvSpPr>
+            <p:cNvPr id="6" name="Rechteck 5">
+              <a:extLst>
+                <a:ext uri="{FF2B5EF4-FFF2-40B4-BE49-F238E27FC236}">
+                  <a16:creationId xmlns:a16="http://schemas.microsoft.com/office/drawing/2014/main" id="{BB0B3755-5F21-48E5-988A-183FA40BE993}"/>
+                </a:ext>
+              </a:extLst>
+            </p:cNvPr>
+            <p:cNvSpPr/>
+            <p:nvPr/>
+          </p:nvSpPr>
+          <p:spPr>
+            <a:xfrm>
+              <a:off x="7713207" y="6116680"/>
+              <a:ext cx="4463547" cy="735874"/>
+            </a:xfrm>
+            <a:prstGeom prst="rect">
+              <a:avLst/>
+            </a:prstGeom>
+            <a:solidFill>
+              <a:schemeClr val="bg1">
+                <a:lumMod val="85000"/>
+              </a:schemeClr>
+            </a:solidFill>
+            <a:ln w="31750">
+              <a:solidFill>
+                <a:schemeClr val="bg1">
+                  <a:lumMod val="50000"/>
+                </a:schemeClr>
+              </a:solidFill>
+            </a:ln>
+          </p:spPr>
+          <p:style>
+            <a:lnRef idx="2">
+              <a:schemeClr val="accent1">
+                <a:shade val="50000"/>
+              </a:schemeClr>
+            </a:lnRef>
+            <a:fillRef idx="1">
+              <a:schemeClr val="accent1"/>
+            </a:fillRef>
+            <a:effectRef idx="0">
+              <a:schemeClr val="accent1"/>
+            </a:effectRef>
+            <a:fontRef idx="minor">
+              <a:schemeClr val="lt1"/>
+            </a:fontRef>
+          </p:style>
+          <p:txBody>
+            <a:bodyPr rtlCol="0" anchor="ctr"/>
+            <a:lstStyle/>
+            <a:p>
+              <a:pPr algn="ctr"/>
+              <a:r>
+                <a:rPr lang="en-US" sz="2000" dirty="0" err="1">
+                  <a:solidFill>
+                    <a:schemeClr val="tx1"/>
+                  </a:solidFill>
+                </a:rPr>
+                <a:t>Konfigurationsfeld</a:t>
+              </a:r>
+              <a:endParaRPr lang="de-DE" dirty="0">
+                <a:solidFill>
+                  <a:schemeClr val="tx1"/>
+                </a:solidFill>
+              </a:endParaRPr>
+            </a:p>
+          </p:txBody>
+        </p:sp>
+        <p:sp>
+          <p:nvSpPr>
+            <p:cNvPr id="7" name="Rechteck 6">
+              <a:extLst>
+                <a:ext uri="{FF2B5EF4-FFF2-40B4-BE49-F238E27FC236}">
+                  <a16:creationId xmlns:a16="http://schemas.microsoft.com/office/drawing/2014/main" id="{62C82B8B-BE55-4729-B09E-417C0AE0DE93}"/>
+                </a:ext>
+              </a:extLst>
+            </p:cNvPr>
+            <p:cNvSpPr/>
+            <p:nvPr/>
+          </p:nvSpPr>
+          <p:spPr>
+            <a:xfrm>
+              <a:off x="4864142" y="6122126"/>
+              <a:ext cx="2887295" cy="735874"/>
+            </a:xfrm>
+            <a:prstGeom prst="rect">
+              <a:avLst/>
+            </a:prstGeom>
+            <a:solidFill>
+              <a:schemeClr val="bg1">
+                <a:lumMod val="85000"/>
+              </a:schemeClr>
+            </a:solidFill>
+            <a:ln w="31750">
+              <a:solidFill>
+                <a:schemeClr val="bg1">
+                  <a:lumMod val="50000"/>
+                </a:schemeClr>
+              </a:solidFill>
+            </a:ln>
+          </p:spPr>
+          <p:style>
+            <a:lnRef idx="2">
+              <a:schemeClr val="accent1">
+                <a:shade val="50000"/>
+              </a:schemeClr>
+            </a:lnRef>
+            <a:fillRef idx="1">
+              <a:schemeClr val="accent1"/>
+            </a:fillRef>
+            <a:effectRef idx="0">
+              <a:schemeClr val="accent1"/>
+            </a:effectRef>
+            <a:fontRef idx="minor">
+              <a:schemeClr val="lt1"/>
+            </a:fontRef>
+          </p:style>
+          <p:txBody>
+            <a:bodyPr rtlCol="0" anchor="ctr"/>
+            <a:lstStyle/>
+            <a:p>
+              <a:pPr algn="ctr"/>
+              <a:r>
+                <a:rPr lang="en-US" sz="2000" dirty="0" err="1">
+                  <a:solidFill>
+                    <a:schemeClr val="tx1"/>
+                  </a:solidFill>
+                </a:rPr>
+                <a:t>Prototypenfeld</a:t>
+              </a:r>
+              <a:endParaRPr lang="de-DE" dirty="0">
+                <a:solidFill>
+                  <a:schemeClr val="tx1"/>
+                </a:solidFill>
+              </a:endParaRPr>
+            </a:p>
+          </p:txBody>
+        </p:sp>
+        <p:sp>
+          <p:nvSpPr>
+            <p:cNvPr id="38" name="Rechteck 37">
+              <a:extLst>
+                <a:ext uri="{FF2B5EF4-FFF2-40B4-BE49-F238E27FC236}">
+                  <a16:creationId xmlns:a16="http://schemas.microsoft.com/office/drawing/2014/main" id="{2A62FDA8-1A0A-40DF-B4BF-06E10445527B}"/>
+                </a:ext>
+              </a:extLst>
+            </p:cNvPr>
+            <p:cNvSpPr/>
+            <p:nvPr/>
+          </p:nvSpPr>
+          <p:spPr>
+            <a:xfrm>
+              <a:off x="1976847" y="6137367"/>
+              <a:ext cx="2887295" cy="735874"/>
+            </a:xfrm>
+            <a:prstGeom prst="rect">
+              <a:avLst/>
+            </a:prstGeom>
+            <a:solidFill>
+              <a:schemeClr val="bg1">
+                <a:lumMod val="85000"/>
+              </a:schemeClr>
+            </a:solidFill>
+            <a:ln w="31750">
+              <a:solidFill>
+                <a:schemeClr val="bg1">
+                  <a:lumMod val="50000"/>
+                </a:schemeClr>
+              </a:solidFill>
+            </a:ln>
+          </p:spPr>
+          <p:style>
+            <a:lnRef idx="2">
+              <a:schemeClr val="accent1">
+                <a:shade val="50000"/>
+              </a:schemeClr>
+            </a:lnRef>
+            <a:fillRef idx="1">
+              <a:schemeClr val="accent1"/>
+            </a:fillRef>
+            <a:effectRef idx="0">
+              <a:schemeClr val="accent1"/>
+            </a:effectRef>
+            <a:fontRef idx="minor">
+              <a:schemeClr val="lt1"/>
+            </a:fontRef>
+          </p:style>
+          <p:txBody>
+            <a:bodyPr rtlCol="0" anchor="ctr"/>
+            <a:lstStyle/>
+            <a:p>
+              <a:pPr algn="ctr"/>
+              <a:r>
+                <a:rPr lang="en-US" sz="2000" dirty="0" err="1">
+                  <a:solidFill>
+                    <a:schemeClr val="tx1"/>
+                  </a:solidFill>
+                </a:rPr>
+                <a:t>Menü</a:t>
+              </a:r>
+              <a:endParaRPr lang="de-DE" dirty="0">
+                <a:solidFill>
+                  <a:schemeClr val="tx1"/>
+                </a:solidFill>
+              </a:endParaRPr>
+            </a:p>
+          </p:txBody>
+        </p:sp>
+      </p:grpSp>
       <p:sp>
         <p:nvSpPr>
           <p:cNvPr id="12" name="Rechteck 11">
@@ -4169,7 +4186,7 @@
         <p:spPr>
           <a:xfrm>
             <a:off x="-8709" y="1001484"/>
-            <a:ext cx="104504" cy="5094514"/>
+            <a:ext cx="45719" cy="5094514"/>
           </a:xfrm>
           <a:prstGeom prst="rect">
             <a:avLst/>
@@ -4215,10 +4232,10 @@
       </p:sp>
       <p:sp>
         <p:nvSpPr>
-          <p:cNvPr id="13" name="Rechteck 12">
-            <a:extLst>
-              <a:ext uri="{FF2B5EF4-FFF2-40B4-BE49-F238E27FC236}">
-                <a16:creationId xmlns:a16="http://schemas.microsoft.com/office/drawing/2014/main" id="{7D56BEAB-6F86-4C81-8B98-78E40EC63A80}"/>
+          <p:cNvPr id="16" name="Rechteck 15">
+            <a:extLst>
+              <a:ext uri="{FF2B5EF4-FFF2-40B4-BE49-F238E27FC236}">
+                <a16:creationId xmlns:a16="http://schemas.microsoft.com/office/drawing/2014/main" id="{6CB02D77-903A-4CE5-A507-FE03378C5E29}"/>
               </a:ext>
             </a:extLst>
           </p:cNvPr>
@@ -4227,8 +4244,64 @@
         </p:nvSpPr>
         <p:spPr>
           <a:xfrm>
-            <a:off x="1132111" y="-34836"/>
-            <a:ext cx="11051181" cy="148046"/>
+            <a:off x="5983875" y="39187"/>
+            <a:ext cx="6216830" cy="6082938"/>
+          </a:xfrm>
+          <a:prstGeom prst="rect">
+            <a:avLst/>
+          </a:prstGeom>
+          <a:solidFill>
+            <a:srgbClr val="00B050"/>
+          </a:solidFill>
+          <a:ln w="31750">
+            <a:noFill/>
+          </a:ln>
+        </p:spPr>
+        <p:style>
+          <a:lnRef idx="2">
+            <a:schemeClr val="accent1">
+              <a:shade val="50000"/>
+            </a:schemeClr>
+          </a:lnRef>
+          <a:fillRef idx="1">
+            <a:schemeClr val="accent1"/>
+          </a:fillRef>
+          <a:effectRef idx="0">
+            <a:schemeClr val="accent1"/>
+          </a:effectRef>
+          <a:fontRef idx="minor">
+            <a:schemeClr val="lt1"/>
+          </a:fontRef>
+        </p:style>
+        <p:txBody>
+          <a:bodyPr rtlCol="0" anchor="ctr"/>
+          <a:lstStyle/>
+          <a:p>
+            <a:pPr algn="ctr"/>
+            <a:endParaRPr lang="de-DE" dirty="0">
+              <a:solidFill>
+                <a:schemeClr val="tx1"/>
+              </a:solidFill>
+            </a:endParaRPr>
+          </a:p>
+        </p:txBody>
+      </p:sp>
+      <p:sp>
+        <p:nvSpPr>
+          <p:cNvPr id="14" name="Rechteck 13">
+            <a:extLst>
+              <a:ext uri="{FF2B5EF4-FFF2-40B4-BE49-F238E27FC236}">
+                <a16:creationId xmlns:a16="http://schemas.microsoft.com/office/drawing/2014/main" id="{79B1F652-B368-4DF8-A01B-35383BF71C7D}"/>
+              </a:ext>
+            </a:extLst>
+          </p:cNvPr>
+          <p:cNvSpPr/>
+          <p:nvPr/>
+        </p:nvSpPr>
+        <p:spPr>
+          <a:xfrm>
+            <a:off x="11081653" y="74023"/>
+            <a:ext cx="1114699" cy="1027611"/>
           </a:xfrm>
           <a:prstGeom prst="rect">
             <a:avLst/>
@@ -4264,6 +4337,25 @@
           <a:lstStyle/>
           <a:p>
             <a:pPr algn="ctr"/>
+            <a:r>
+              <a:rPr lang="en-US" sz="3200" dirty="0">
+                <a:solidFill>
+                  <a:schemeClr val="bg1"/>
+                </a:solidFill>
+              </a:rPr>
+              <a:t>Soll</a:t>
+            </a:r>
+          </a:p>
+          <a:p>
+            <a:pPr algn="ctr"/>
+            <a:r>
+              <a:rPr lang="en-US" dirty="0" err="1">
+                <a:solidFill>
+                  <a:schemeClr val="bg1"/>
+                </a:solidFill>
+              </a:rPr>
+              <a:t>Zustand</a:t>
+            </a:r>
             <a:endParaRPr lang="de-DE" dirty="0">
               <a:solidFill>
                 <a:schemeClr val="bg1"/>
@@ -4272,10 +4364,491 @@
           </a:p>
         </p:txBody>
       </p:sp>
+      <p:sp>
+        <p:nvSpPr>
+          <p:cNvPr id="15" name="Rechteck 14">
+            <a:extLst>
+              <a:ext uri="{FF2B5EF4-FFF2-40B4-BE49-F238E27FC236}">
+                <a16:creationId xmlns:a16="http://schemas.microsoft.com/office/drawing/2014/main" id="{A8E92EEA-0821-4DFB-A023-22671645F468}"/>
+              </a:ext>
+            </a:extLst>
+          </p:cNvPr>
+          <p:cNvSpPr/>
+          <p:nvPr/>
+        </p:nvSpPr>
+        <p:spPr>
+          <a:xfrm>
+            <a:off x="5969726" y="3497038"/>
+            <a:ext cx="59868" cy="2598960"/>
+          </a:xfrm>
+          <a:prstGeom prst="rect">
+            <a:avLst/>
+          </a:prstGeom>
+          <a:solidFill>
+            <a:schemeClr val="tx1"/>
+          </a:solidFill>
+          <a:ln w="31750">
+            <a:solidFill>
+              <a:schemeClr val="tx1"/>
+            </a:solidFill>
+            <a:round/>
+          </a:ln>
+        </p:spPr>
+        <p:style>
+          <a:lnRef idx="2">
+            <a:schemeClr val="accent1">
+              <a:shade val="50000"/>
+            </a:schemeClr>
+          </a:lnRef>
+          <a:fillRef idx="1">
+            <a:schemeClr val="accent1"/>
+          </a:fillRef>
+          <a:effectRef idx="0">
+            <a:schemeClr val="accent1"/>
+          </a:effectRef>
+          <a:fontRef idx="minor">
+            <a:schemeClr val="lt1"/>
+          </a:fontRef>
+        </p:style>
+        <p:txBody>
+          <a:bodyPr rtlCol="0" anchor="ctr"/>
+          <a:lstStyle/>
+          <a:p>
+            <a:pPr algn="ctr"/>
+            <a:endParaRPr lang="de-DE" dirty="0">
+              <a:solidFill>
+                <a:schemeClr val="bg1"/>
+              </a:solidFill>
+            </a:endParaRPr>
+          </a:p>
+        </p:txBody>
+      </p:sp>
+      <p:sp>
+        <p:nvSpPr>
+          <p:cNvPr id="13" name="Rechteck 12">
+            <a:extLst>
+              <a:ext uri="{FF2B5EF4-FFF2-40B4-BE49-F238E27FC236}">
+                <a16:creationId xmlns:a16="http://schemas.microsoft.com/office/drawing/2014/main" id="{7D56BEAB-6F86-4C81-8B98-78E40EC63A80}"/>
+              </a:ext>
+            </a:extLst>
+          </p:cNvPr>
+          <p:cNvSpPr/>
+          <p:nvPr/>
+        </p:nvSpPr>
+        <p:spPr>
+          <a:xfrm>
+            <a:off x="1132111" y="0"/>
+            <a:ext cx="11051181" cy="74023"/>
+          </a:xfrm>
+          <a:prstGeom prst="rect">
+            <a:avLst/>
+          </a:prstGeom>
+          <a:solidFill>
+            <a:schemeClr val="tx1"/>
+          </a:solidFill>
+          <a:ln w="31750">
+            <a:solidFill>
+              <a:schemeClr val="tx1"/>
+            </a:solidFill>
+            <a:round/>
+          </a:ln>
+        </p:spPr>
+        <p:style>
+          <a:lnRef idx="2">
+            <a:schemeClr val="accent1">
+              <a:shade val="50000"/>
+            </a:schemeClr>
+          </a:lnRef>
+          <a:fillRef idx="1">
+            <a:schemeClr val="accent1"/>
+          </a:fillRef>
+          <a:effectRef idx="0">
+            <a:schemeClr val="accent1"/>
+          </a:effectRef>
+          <a:fontRef idx="minor">
+            <a:schemeClr val="lt1"/>
+          </a:fontRef>
+        </p:style>
+        <p:txBody>
+          <a:bodyPr rtlCol="0" anchor="ctr"/>
+          <a:lstStyle/>
+          <a:p>
+            <a:pPr algn="ctr"/>
+            <a:endParaRPr lang="de-DE" dirty="0">
+              <a:solidFill>
+                <a:schemeClr val="bg1"/>
+              </a:solidFill>
+            </a:endParaRPr>
+          </a:p>
+        </p:txBody>
+      </p:sp>
+      <p:sp>
+        <p:nvSpPr>
+          <p:cNvPr id="18" name="Rechteck 17">
+            <a:extLst>
+              <a:ext uri="{FF2B5EF4-FFF2-40B4-BE49-F238E27FC236}">
+                <a16:creationId xmlns:a16="http://schemas.microsoft.com/office/drawing/2014/main" id="{7CA143AA-5B36-4361-98B1-C7262A6922E0}"/>
+              </a:ext>
+            </a:extLst>
+          </p:cNvPr>
+          <p:cNvSpPr/>
+          <p:nvPr/>
+        </p:nvSpPr>
+        <p:spPr>
+          <a:xfrm rot="5400000" flipH="1">
+            <a:off x="6073140" y="11978"/>
+            <a:ext cx="45719" cy="12209414"/>
+          </a:xfrm>
+          <a:prstGeom prst="rect">
+            <a:avLst/>
+          </a:prstGeom>
+          <a:solidFill>
+            <a:schemeClr val="tx1"/>
+          </a:solidFill>
+          <a:ln w="31750">
+            <a:solidFill>
+              <a:schemeClr val="tx1"/>
+            </a:solidFill>
+            <a:round/>
+          </a:ln>
+        </p:spPr>
+        <p:style>
+          <a:lnRef idx="2">
+            <a:schemeClr val="accent1">
+              <a:shade val="50000"/>
+            </a:schemeClr>
+          </a:lnRef>
+          <a:fillRef idx="1">
+            <a:schemeClr val="accent1"/>
+          </a:fillRef>
+          <a:effectRef idx="0">
+            <a:schemeClr val="accent1"/>
+          </a:effectRef>
+          <a:fontRef idx="minor">
+            <a:schemeClr val="lt1"/>
+          </a:fontRef>
+        </p:style>
+        <p:txBody>
+          <a:bodyPr rtlCol="0" anchor="ctr"/>
+          <a:lstStyle/>
+          <a:p>
+            <a:pPr algn="ctr"/>
+            <a:endParaRPr lang="de-DE" dirty="0">
+              <a:solidFill>
+                <a:schemeClr val="bg1"/>
+              </a:solidFill>
+            </a:endParaRPr>
+          </a:p>
+        </p:txBody>
+      </p:sp>
+      <p:sp>
+        <p:nvSpPr>
+          <p:cNvPr id="19" name="Rechteck 18">
+            <a:extLst>
+              <a:ext uri="{FF2B5EF4-FFF2-40B4-BE49-F238E27FC236}">
+                <a16:creationId xmlns:a16="http://schemas.microsoft.com/office/drawing/2014/main" id="{B470E546-2CF2-43EA-845E-9AC7F7BF6B9E}"/>
+              </a:ext>
+            </a:extLst>
+          </p:cNvPr>
+          <p:cNvSpPr/>
+          <p:nvPr/>
+        </p:nvSpPr>
+        <p:spPr>
+          <a:xfrm flipH="1">
+            <a:off x="12176754" y="-279759"/>
+            <a:ext cx="45719" cy="6419304"/>
+          </a:xfrm>
+          <a:prstGeom prst="rect">
+            <a:avLst/>
+          </a:prstGeom>
+          <a:solidFill>
+            <a:schemeClr val="tx1"/>
+          </a:solidFill>
+          <a:ln w="31750">
+            <a:solidFill>
+              <a:schemeClr val="tx1"/>
+            </a:solidFill>
+            <a:round/>
+          </a:ln>
+        </p:spPr>
+        <p:style>
+          <a:lnRef idx="2">
+            <a:schemeClr val="accent1">
+              <a:shade val="50000"/>
+            </a:schemeClr>
+          </a:lnRef>
+          <a:fillRef idx="1">
+            <a:schemeClr val="accent1"/>
+          </a:fillRef>
+          <a:effectRef idx="0">
+            <a:schemeClr val="accent1"/>
+          </a:effectRef>
+          <a:fontRef idx="minor">
+            <a:schemeClr val="lt1"/>
+          </a:fontRef>
+        </p:style>
+        <p:txBody>
+          <a:bodyPr rtlCol="0" anchor="ctr"/>
+          <a:lstStyle/>
+          <a:p>
+            <a:pPr algn="ctr"/>
+            <a:endParaRPr lang="de-DE" dirty="0">
+              <a:solidFill>
+                <a:schemeClr val="bg1"/>
+              </a:solidFill>
+            </a:endParaRPr>
+          </a:p>
+        </p:txBody>
+      </p:sp>
+      <p:sp>
+        <p:nvSpPr>
+          <p:cNvPr id="20" name="Rechteck 19">
+            <a:extLst>
+              <a:ext uri="{FF2B5EF4-FFF2-40B4-BE49-F238E27FC236}">
+                <a16:creationId xmlns:a16="http://schemas.microsoft.com/office/drawing/2014/main" id="{34A33C59-68E5-4434-ABBA-BA647A5038F6}"/>
+              </a:ext>
+            </a:extLst>
+          </p:cNvPr>
+          <p:cNvSpPr/>
+          <p:nvPr/>
+        </p:nvSpPr>
+        <p:spPr>
+          <a:xfrm>
+            <a:off x="5983875" y="80012"/>
+            <a:ext cx="45719" cy="2410639"/>
+          </a:xfrm>
+          <a:prstGeom prst="rect">
+            <a:avLst/>
+          </a:prstGeom>
+          <a:solidFill>
+            <a:schemeClr val="tx1"/>
+          </a:solidFill>
+          <a:ln w="31750">
+            <a:solidFill>
+              <a:schemeClr val="tx1"/>
+            </a:solidFill>
+            <a:round/>
+          </a:ln>
+        </p:spPr>
+        <p:style>
+          <a:lnRef idx="2">
+            <a:schemeClr val="accent1">
+              <a:shade val="50000"/>
+            </a:schemeClr>
+          </a:lnRef>
+          <a:fillRef idx="1">
+            <a:schemeClr val="accent1"/>
+          </a:fillRef>
+          <a:effectRef idx="0">
+            <a:schemeClr val="accent1"/>
+          </a:effectRef>
+          <a:fontRef idx="minor">
+            <a:schemeClr val="lt1"/>
+          </a:fontRef>
+        </p:style>
+        <p:txBody>
+          <a:bodyPr rtlCol="0" anchor="ctr"/>
+          <a:lstStyle/>
+          <a:p>
+            <a:pPr algn="ctr"/>
+            <a:endParaRPr lang="de-DE" dirty="0">
+              <a:solidFill>
+                <a:schemeClr val="bg1"/>
+              </a:solidFill>
+            </a:endParaRPr>
+          </a:p>
+        </p:txBody>
+      </p:sp>
+      <p:sp>
+        <p:nvSpPr>
+          <p:cNvPr id="2" name="Pfeil: nach rechts 1">
+            <a:extLst>
+              <a:ext uri="{FF2B5EF4-FFF2-40B4-BE49-F238E27FC236}">
+                <a16:creationId xmlns:a16="http://schemas.microsoft.com/office/drawing/2014/main" id="{9FDA6CB9-11AE-4BC4-A429-58C61A11F5B8}"/>
+              </a:ext>
+            </a:extLst>
+          </p:cNvPr>
+          <p:cNvSpPr/>
+          <p:nvPr/>
+        </p:nvSpPr>
+        <p:spPr>
+          <a:xfrm>
+            <a:off x="5602873" y="2604414"/>
+            <a:ext cx="807721" cy="781594"/>
+          </a:xfrm>
+          <a:prstGeom prst="rightArrow">
+            <a:avLst/>
+          </a:prstGeom>
+          <a:solidFill>
+            <a:schemeClr val="tx1">
+              <a:alpha val="50000"/>
+            </a:schemeClr>
+          </a:solidFill>
+          <a:ln w="79375">
+            <a:solidFill>
+              <a:schemeClr val="bg1"/>
+            </a:solidFill>
+          </a:ln>
+        </p:spPr>
+        <p:style>
+          <a:lnRef idx="2">
+            <a:schemeClr val="accent1">
+              <a:shade val="50000"/>
+            </a:schemeClr>
+          </a:lnRef>
+          <a:fillRef idx="1">
+            <a:schemeClr val="accent1"/>
+          </a:fillRef>
+          <a:effectRef idx="0">
+            <a:schemeClr val="accent1"/>
+          </a:effectRef>
+          <a:fontRef idx="minor">
+            <a:schemeClr val="lt1"/>
+          </a:fontRef>
+        </p:style>
+        <p:txBody>
+          <a:bodyPr rtlCol="0" anchor="ctr"/>
+          <a:lstStyle/>
+          <a:p>
+            <a:pPr algn="ctr"/>
+            <a:endParaRPr lang="de-DE" dirty="0"/>
+          </a:p>
+        </p:txBody>
+      </p:sp>
+      <p:pic>
+        <p:nvPicPr>
+          <p:cNvPr id="23" name="Grafik 22" descr="Ein Bild, das Screenshot, Person enthält.&#10;&#10;Automatisch generierte Beschreibung">
+            <a:extLst>
+              <a:ext uri="{FF2B5EF4-FFF2-40B4-BE49-F238E27FC236}">
+                <a16:creationId xmlns:a16="http://schemas.microsoft.com/office/drawing/2014/main" id="{A77C6971-5A46-49EF-8C3F-3811569D94F5}"/>
+              </a:ext>
+            </a:extLst>
+          </p:cNvPr>
+          <p:cNvPicPr>
+            <a:picLocks noChangeAspect="1"/>
+          </p:cNvPicPr>
+          <p:nvPr/>
+        </p:nvPicPr>
+        <p:blipFill>
+          <a:blip r:embed="rId2">
+            <a:extLst>
+              <a:ext uri="{28A0092B-C50C-407E-A947-70E740481C1C}">
+                <a14:useLocalDpi xmlns:a14="http://schemas.microsoft.com/office/drawing/2010/main" val="0"/>
+              </a:ext>
+            </a:extLst>
+          </a:blip>
+          <a:stretch>
+            <a:fillRect/>
+          </a:stretch>
+        </p:blipFill>
+        <p:spPr>
+          <a:xfrm>
+            <a:off x="748672" y="1898010"/>
+            <a:ext cx="4663019" cy="2520000"/>
+          </a:xfrm>
+          <a:prstGeom prst="rect">
+            <a:avLst/>
+          </a:prstGeom>
+        </p:spPr>
+      </p:pic>
+      <p:pic>
+        <p:nvPicPr>
+          <p:cNvPr id="25" name="Grafik 24">
+            <a:extLst>
+              <a:ext uri="{FF2B5EF4-FFF2-40B4-BE49-F238E27FC236}">
+                <a16:creationId xmlns:a16="http://schemas.microsoft.com/office/drawing/2014/main" id="{BDF802CE-5597-4B4F-A148-D9CCFB86CE7A}"/>
+              </a:ext>
+            </a:extLst>
+          </p:cNvPr>
+          <p:cNvPicPr>
+            <a:picLocks noChangeAspect="1"/>
+          </p:cNvPicPr>
+          <p:nvPr/>
+        </p:nvPicPr>
+        <p:blipFill>
+          <a:blip r:embed="rId3">
+            <a:extLst>
+              <a:ext uri="{28A0092B-C50C-407E-A947-70E740481C1C}">
+                <a14:useLocalDpi xmlns:a14="http://schemas.microsoft.com/office/drawing/2010/main" val="0"/>
+              </a:ext>
+            </a:extLst>
+          </a:blip>
+          <a:stretch>
+            <a:fillRect/>
+          </a:stretch>
+        </p:blipFill>
+        <p:spPr>
+          <a:xfrm>
+            <a:off x="6757596" y="1898010"/>
+            <a:ext cx="4480000" cy="2520000"/>
+          </a:xfrm>
+          <a:prstGeom prst="rect">
+            <a:avLst/>
+          </a:prstGeom>
+        </p:spPr>
+      </p:pic>
+      <p:sp>
+        <p:nvSpPr>
+          <p:cNvPr id="39" name="Rechteck 38">
+            <a:extLst>
+              <a:ext uri="{FF2B5EF4-FFF2-40B4-BE49-F238E27FC236}">
+                <a16:creationId xmlns:a16="http://schemas.microsoft.com/office/drawing/2014/main" id="{B3C63E9B-E68E-4CC4-ACE8-D288CE4A3A32}"/>
+              </a:ext>
+            </a:extLst>
+          </p:cNvPr>
+          <p:cNvSpPr/>
+          <p:nvPr/>
+        </p:nvSpPr>
+        <p:spPr>
+          <a:xfrm>
+            <a:off x="1976847" y="6150431"/>
+            <a:ext cx="10215153" cy="733698"/>
+          </a:xfrm>
+          <a:prstGeom prst="rect">
+            <a:avLst/>
+          </a:prstGeom>
+          <a:solidFill>
+            <a:schemeClr val="bg1">
+              <a:alpha val="80000"/>
+            </a:schemeClr>
+          </a:solidFill>
+          <a:ln w="31750">
+            <a:noFill/>
+          </a:ln>
+        </p:spPr>
+        <p:style>
+          <a:lnRef idx="2">
+            <a:schemeClr val="accent1">
+              <a:shade val="50000"/>
+            </a:schemeClr>
+          </a:lnRef>
+          <a:fillRef idx="1">
+            <a:schemeClr val="accent1"/>
+          </a:fillRef>
+          <a:effectRef idx="0">
+            <a:schemeClr val="accent1"/>
+          </a:effectRef>
+          <a:fontRef idx="minor">
+            <a:schemeClr val="lt1"/>
+          </a:fontRef>
+        </p:style>
+        <p:txBody>
+          <a:bodyPr rtlCol="0" anchor="ctr"/>
+          <a:lstStyle/>
+          <a:p>
+            <a:pPr algn="ctr"/>
+            <a:endParaRPr lang="de-DE" dirty="0">
+              <a:solidFill>
+                <a:schemeClr val="tx1"/>
+              </a:solidFill>
+            </a:endParaRPr>
+          </a:p>
+        </p:txBody>
+      </p:sp>
     </p:spTree>
     <p:extLst>
       <p:ext uri="{BB962C8B-B14F-4D97-AF65-F5344CB8AC3E}">
-        <p14:creationId xmlns:p14="http://schemas.microsoft.com/office/powerpoint/2010/main" val="3748914707"/>
+        <p14:creationId xmlns:p14="http://schemas.microsoft.com/office/powerpoint/2010/main" val="3403557114"/>
       </p:ext>
     </p:extLst>
   </p:cSld>
@@ -4356,298 +4929,6 @@
       </p:sp>
       <p:sp>
         <p:nvSpPr>
-          <p:cNvPr id="5" name="Rechteck 4">
-            <a:extLst>
-              <a:ext uri="{FF2B5EF4-FFF2-40B4-BE49-F238E27FC236}">
-                <a16:creationId xmlns:a16="http://schemas.microsoft.com/office/drawing/2014/main" id="{F8D33603-EE5F-46B7-8B5E-60A82565FB28}"/>
-              </a:ext>
-            </a:extLst>
-          </p:cNvPr>
-          <p:cNvSpPr/>
-          <p:nvPr/>
-        </p:nvSpPr>
-        <p:spPr>
-          <a:xfrm>
-            <a:off x="0" y="6122126"/>
-            <a:ext cx="4171406" cy="735874"/>
-          </a:xfrm>
-          <a:prstGeom prst="rect">
-            <a:avLst/>
-          </a:prstGeom>
-          <a:solidFill>
-            <a:schemeClr val="bg1">
-              <a:lumMod val="85000"/>
-            </a:schemeClr>
-          </a:solidFill>
-          <a:ln w="31750">
-            <a:solidFill>
-              <a:schemeClr val="bg1">
-                <a:lumMod val="50000"/>
-              </a:schemeClr>
-            </a:solidFill>
-          </a:ln>
-        </p:spPr>
-        <p:style>
-          <a:lnRef idx="2">
-            <a:schemeClr val="accent1">
-              <a:shade val="50000"/>
-            </a:schemeClr>
-          </a:lnRef>
-          <a:fillRef idx="1">
-            <a:schemeClr val="accent1"/>
-          </a:fillRef>
-          <a:effectRef idx="0">
-            <a:schemeClr val="accent1"/>
-          </a:effectRef>
-          <a:fontRef idx="minor">
-            <a:schemeClr val="lt1"/>
-          </a:fontRef>
-        </p:style>
-        <p:txBody>
-          <a:bodyPr rtlCol="0" anchor="ctr"/>
-          <a:lstStyle/>
-          <a:p>
-            <a:pPr algn="ctr"/>
-            <a:r>
-              <a:rPr lang="en-US" sz="2000" dirty="0" err="1">
-                <a:solidFill>
-                  <a:schemeClr val="tx1"/>
-                </a:solidFill>
-              </a:rPr>
-              <a:t>Hauptfenster</a:t>
-            </a:r>
-            <a:endParaRPr lang="de-DE" dirty="0">
-              <a:solidFill>
-                <a:schemeClr val="tx1"/>
-              </a:solidFill>
-            </a:endParaRPr>
-          </a:p>
-        </p:txBody>
-      </p:sp>
-      <p:sp>
-        <p:nvSpPr>
-          <p:cNvPr id="6" name="Rechteck 5">
-            <a:extLst>
-              <a:ext uri="{FF2B5EF4-FFF2-40B4-BE49-F238E27FC236}">
-                <a16:creationId xmlns:a16="http://schemas.microsoft.com/office/drawing/2014/main" id="{BB0B3755-5F21-48E5-988A-183FA40BE993}"/>
-              </a:ext>
-            </a:extLst>
-          </p:cNvPr>
-          <p:cNvSpPr/>
-          <p:nvPr/>
-        </p:nvSpPr>
-        <p:spPr>
-          <a:xfrm>
-            <a:off x="4171406" y="6122126"/>
-            <a:ext cx="4119154" cy="735874"/>
-          </a:xfrm>
-          <a:prstGeom prst="rect">
-            <a:avLst/>
-          </a:prstGeom>
-          <a:solidFill>
-            <a:schemeClr val="bg1">
-              <a:lumMod val="85000"/>
-            </a:schemeClr>
-          </a:solidFill>
-          <a:ln w="31750">
-            <a:solidFill>
-              <a:schemeClr val="bg1">
-                <a:lumMod val="50000"/>
-              </a:schemeClr>
-            </a:solidFill>
-          </a:ln>
-        </p:spPr>
-        <p:style>
-          <a:lnRef idx="2">
-            <a:schemeClr val="accent1">
-              <a:shade val="50000"/>
-            </a:schemeClr>
-          </a:lnRef>
-          <a:fillRef idx="1">
-            <a:schemeClr val="accent1"/>
-          </a:fillRef>
-          <a:effectRef idx="0">
-            <a:schemeClr val="accent1"/>
-          </a:effectRef>
-          <a:fontRef idx="minor">
-            <a:schemeClr val="lt1"/>
-          </a:fontRef>
-        </p:style>
-        <p:txBody>
-          <a:bodyPr rtlCol="0" anchor="ctr"/>
-          <a:lstStyle/>
-          <a:p>
-            <a:pPr algn="ctr"/>
-            <a:r>
-              <a:rPr lang="en-US" sz="2000" dirty="0" err="1">
-                <a:solidFill>
-                  <a:schemeClr val="tx1"/>
-                </a:solidFill>
-              </a:rPr>
-              <a:t>Konfigurationsfeld</a:t>
-            </a:r>
-            <a:endParaRPr lang="de-DE" dirty="0">
-              <a:solidFill>
-                <a:schemeClr val="tx1"/>
-              </a:solidFill>
-            </a:endParaRPr>
-          </a:p>
-        </p:txBody>
-      </p:sp>
-      <p:sp>
-        <p:nvSpPr>
-          <p:cNvPr id="7" name="Rechteck 6">
-            <a:extLst>
-              <a:ext uri="{FF2B5EF4-FFF2-40B4-BE49-F238E27FC236}">
-                <a16:creationId xmlns:a16="http://schemas.microsoft.com/office/drawing/2014/main" id="{62C82B8B-BE55-4729-B09E-417C0AE0DE93}"/>
-              </a:ext>
-            </a:extLst>
-          </p:cNvPr>
-          <p:cNvSpPr/>
-          <p:nvPr/>
-        </p:nvSpPr>
-        <p:spPr>
-          <a:xfrm>
-            <a:off x="8290560" y="6122126"/>
-            <a:ext cx="3901440" cy="735874"/>
-          </a:xfrm>
-          <a:prstGeom prst="rect">
-            <a:avLst/>
-          </a:prstGeom>
-          <a:solidFill>
-            <a:schemeClr val="bg1">
-              <a:lumMod val="85000"/>
-            </a:schemeClr>
-          </a:solidFill>
-          <a:ln w="31750">
-            <a:solidFill>
-              <a:schemeClr val="bg1">
-                <a:lumMod val="50000"/>
-              </a:schemeClr>
-            </a:solidFill>
-          </a:ln>
-        </p:spPr>
-        <p:style>
-          <a:lnRef idx="2">
-            <a:schemeClr val="accent1">
-              <a:shade val="50000"/>
-            </a:schemeClr>
-          </a:lnRef>
-          <a:fillRef idx="1">
-            <a:schemeClr val="accent1"/>
-          </a:fillRef>
-          <a:effectRef idx="0">
-            <a:schemeClr val="accent1"/>
-          </a:effectRef>
-          <a:fontRef idx="minor">
-            <a:schemeClr val="lt1"/>
-          </a:fontRef>
-        </p:style>
-        <p:txBody>
-          <a:bodyPr rtlCol="0" anchor="ctr"/>
-          <a:lstStyle/>
-          <a:p>
-            <a:pPr algn="ctr"/>
-            <a:r>
-              <a:rPr lang="en-US" sz="2000" dirty="0">
-                <a:solidFill>
-                  <a:schemeClr val="tx1"/>
-                </a:solidFill>
-              </a:rPr>
-              <a:t>Editor </a:t>
-            </a:r>
-            <a:r>
-              <a:rPr lang="en-US" sz="2000" dirty="0" err="1">
-                <a:solidFill>
-                  <a:schemeClr val="tx1"/>
-                </a:solidFill>
-              </a:rPr>
-              <a:t>für</a:t>
-            </a:r>
-            <a:r>
-              <a:rPr lang="en-US" sz="2000" dirty="0">
-                <a:solidFill>
-                  <a:schemeClr val="tx1"/>
-                </a:solidFill>
-              </a:rPr>
-              <a:t> </a:t>
-            </a:r>
-            <a:r>
-              <a:rPr lang="en-US" sz="2000" dirty="0" err="1">
-                <a:solidFill>
-                  <a:schemeClr val="tx1"/>
-                </a:solidFill>
-              </a:rPr>
-              <a:t>Konfigurationen</a:t>
-            </a:r>
-            <a:endParaRPr lang="de-DE" dirty="0">
-              <a:solidFill>
-                <a:schemeClr val="tx1"/>
-              </a:solidFill>
-            </a:endParaRPr>
-          </a:p>
-        </p:txBody>
-      </p:sp>
-      <p:sp>
-        <p:nvSpPr>
-          <p:cNvPr id="9" name="Rechteck 8">
-            <a:extLst>
-              <a:ext uri="{FF2B5EF4-FFF2-40B4-BE49-F238E27FC236}">
-                <a16:creationId xmlns:a16="http://schemas.microsoft.com/office/drawing/2014/main" id="{81AF1F01-DE57-4926-B2A4-A4CCC4CDB337}"/>
-              </a:ext>
-            </a:extLst>
-          </p:cNvPr>
-          <p:cNvSpPr/>
-          <p:nvPr/>
-        </p:nvSpPr>
-        <p:spPr>
-          <a:xfrm>
-            <a:off x="4180114" y="5982796"/>
-            <a:ext cx="8186056" cy="1193067"/>
-          </a:xfrm>
-          <a:prstGeom prst="rect">
-            <a:avLst/>
-          </a:prstGeom>
-          <a:solidFill>
-            <a:schemeClr val="bg1">
-              <a:alpha val="80000"/>
-            </a:schemeClr>
-          </a:solidFill>
-          <a:ln w="31750">
-            <a:noFill/>
-          </a:ln>
-        </p:spPr>
-        <p:style>
-          <a:lnRef idx="2">
-            <a:schemeClr val="accent1">
-              <a:shade val="50000"/>
-            </a:schemeClr>
-          </a:lnRef>
-          <a:fillRef idx="1">
-            <a:schemeClr val="accent1"/>
-          </a:fillRef>
-          <a:effectRef idx="0">
-            <a:schemeClr val="accent1"/>
-          </a:effectRef>
-          <a:fontRef idx="minor">
-            <a:schemeClr val="lt1"/>
-          </a:fontRef>
-        </p:style>
-        <p:txBody>
-          <a:bodyPr rtlCol="0" anchor="ctr"/>
-          <a:lstStyle/>
-          <a:p>
-            <a:pPr algn="ctr"/>
-            <a:endParaRPr lang="de-DE" dirty="0">
-              <a:solidFill>
-                <a:schemeClr val="tx1"/>
-              </a:solidFill>
-            </a:endParaRPr>
-          </a:p>
-        </p:txBody>
-      </p:sp>
-      <p:sp>
-        <p:nvSpPr>
           <p:cNvPr id="10" name="Rechteck 9">
             <a:extLst>
               <a:ext uri="{FF2B5EF4-FFF2-40B4-BE49-F238E27FC236}">
@@ -4754,25 +5035,14 @@
           <a:p>
             <a:pPr algn="ctr"/>
             <a:r>
-              <a:rPr lang="en-US" sz="3200" dirty="0">
+              <a:rPr lang="en-US" sz="3200" dirty="0" err="1">
                 <a:solidFill>
                   <a:schemeClr val="bg1"/>
                 </a:solidFill>
               </a:rPr>
-              <a:t>IST</a:t>
-            </a:r>
-          </a:p>
-          <a:p>
-            <a:pPr algn="ctr"/>
-            <a:r>
-              <a:rPr lang="en-US" dirty="0" err="1">
-                <a:solidFill>
-                  <a:schemeClr val="bg1"/>
-                </a:solidFill>
-              </a:rPr>
-              <a:t>Zustand</a:t>
-            </a:r>
-            <a:endParaRPr lang="de-DE" dirty="0">
+              <a:t>ToDo</a:t>
+            </a:r>
+            <a:endParaRPr lang="en-US" sz="3200" dirty="0">
               <a:solidFill>
                 <a:schemeClr val="bg1"/>
               </a:solidFill>
@@ -5324,10 +5594,737 @@
           </a:p>
         </p:txBody>
       </p:sp>
+      <p:pic>
+        <p:nvPicPr>
+          <p:cNvPr id="23" name="Grafik 22" descr="Ein Bild, das Screenshot, Person enthält.&#10;&#10;Automatisch generierte Beschreibung">
+            <a:extLst>
+              <a:ext uri="{FF2B5EF4-FFF2-40B4-BE49-F238E27FC236}">
+                <a16:creationId xmlns:a16="http://schemas.microsoft.com/office/drawing/2014/main" id="{A77C6971-5A46-49EF-8C3F-3811569D94F5}"/>
+              </a:ext>
+            </a:extLst>
+          </p:cNvPr>
+          <p:cNvPicPr>
+            <a:picLocks noChangeAspect="1"/>
+          </p:cNvPicPr>
+          <p:nvPr/>
+        </p:nvPicPr>
+        <p:blipFill rotWithShape="1">
+          <a:blip r:embed="rId2">
+            <a:extLst>
+              <a:ext uri="{28A0092B-C50C-407E-A947-70E740481C1C}">
+                <a14:useLocalDpi xmlns:a14="http://schemas.microsoft.com/office/drawing/2010/main" val="0"/>
+              </a:ext>
+            </a:extLst>
+          </a:blip>
+          <a:srcRect b="78662"/>
+          <a:stretch/>
+        </p:blipFill>
+        <p:spPr>
+          <a:xfrm>
+            <a:off x="1222131" y="239385"/>
+            <a:ext cx="4663019" cy="537710"/>
+          </a:xfrm>
+          <a:prstGeom prst="rect">
+            <a:avLst/>
+          </a:prstGeom>
+        </p:spPr>
+      </p:pic>
+      <p:pic>
+        <p:nvPicPr>
+          <p:cNvPr id="25" name="Grafik 24">
+            <a:extLst>
+              <a:ext uri="{FF2B5EF4-FFF2-40B4-BE49-F238E27FC236}">
+                <a16:creationId xmlns:a16="http://schemas.microsoft.com/office/drawing/2014/main" id="{BDF802CE-5597-4B4F-A148-D9CCFB86CE7A}"/>
+              </a:ext>
+            </a:extLst>
+          </p:cNvPr>
+          <p:cNvPicPr>
+            <a:picLocks noChangeAspect="1"/>
+          </p:cNvPicPr>
+          <p:nvPr/>
+        </p:nvPicPr>
+        <p:blipFill>
+          <a:blip r:embed="rId3">
+            <a:extLst>
+              <a:ext uri="{28A0092B-C50C-407E-A947-70E740481C1C}">
+                <a14:useLocalDpi xmlns:a14="http://schemas.microsoft.com/office/drawing/2010/main" val="0"/>
+              </a:ext>
+            </a:extLst>
+          </a:blip>
+          <a:stretch>
+            <a:fillRect/>
+          </a:stretch>
+        </p:blipFill>
+        <p:spPr>
+          <a:xfrm>
+            <a:off x="6757596" y="1898010"/>
+            <a:ext cx="4480000" cy="2520000"/>
+          </a:xfrm>
+          <a:prstGeom prst="rect">
+            <a:avLst/>
+          </a:prstGeom>
+        </p:spPr>
+      </p:pic>
+      <p:sp>
+        <p:nvSpPr>
+          <p:cNvPr id="24" name="Rechteck 23">
+            <a:extLst>
+              <a:ext uri="{FF2B5EF4-FFF2-40B4-BE49-F238E27FC236}">
+                <a16:creationId xmlns:a16="http://schemas.microsoft.com/office/drawing/2014/main" id="{49317DBA-9FA2-425A-8336-2006686E54C5}"/>
+              </a:ext>
+            </a:extLst>
+          </p:cNvPr>
+          <p:cNvSpPr/>
+          <p:nvPr/>
+        </p:nvSpPr>
+        <p:spPr>
+          <a:xfrm>
+            <a:off x="440474" y="2339595"/>
+            <a:ext cx="4692820" cy="884489"/>
+          </a:xfrm>
+          <a:prstGeom prst="rect">
+            <a:avLst/>
+          </a:prstGeom>
+          <a:solidFill>
+            <a:srgbClr val="FF0000">
+              <a:alpha val="85000"/>
+            </a:srgbClr>
+          </a:solidFill>
+          <a:ln w="57150">
+            <a:solidFill>
+              <a:srgbClr val="C00000"/>
+            </a:solidFill>
+          </a:ln>
+        </p:spPr>
+        <p:style>
+          <a:lnRef idx="2">
+            <a:schemeClr val="accent1">
+              <a:shade val="50000"/>
+            </a:schemeClr>
+          </a:lnRef>
+          <a:fillRef idx="1">
+            <a:schemeClr val="accent1"/>
+          </a:fillRef>
+          <a:effectRef idx="0">
+            <a:schemeClr val="accent1"/>
+          </a:effectRef>
+          <a:fontRef idx="minor">
+            <a:schemeClr val="lt1"/>
+          </a:fontRef>
+        </p:style>
+        <p:txBody>
+          <a:bodyPr rtlCol="0" anchor="ctr"/>
+          <a:lstStyle/>
+          <a:p>
+            <a:pPr algn="ctr"/>
+            <a:r>
+              <a:rPr lang="en-US" sz="2400" dirty="0" err="1">
+                <a:ln w="12700">
+                  <a:noFill/>
+                </a:ln>
+                <a:solidFill>
+                  <a:schemeClr val="bg1"/>
+                </a:solidFill>
+              </a:rPr>
+              <a:t>Aktion</a:t>
+            </a:r>
+            <a:r>
+              <a:rPr lang="en-US" sz="2400" dirty="0">
+                <a:ln w="12700">
+                  <a:noFill/>
+                </a:ln>
+                <a:solidFill>
+                  <a:schemeClr val="bg1"/>
+                </a:solidFill>
+              </a:rPr>
+              <a:t> Listeners </a:t>
+            </a:r>
+            <a:r>
+              <a:rPr lang="en-US" sz="2400" dirty="0" err="1">
+                <a:ln w="12700">
+                  <a:noFill/>
+                </a:ln>
+                <a:solidFill>
+                  <a:schemeClr val="bg1"/>
+                </a:solidFill>
+              </a:rPr>
+              <a:t>hinzufügen</a:t>
+            </a:r>
+            <a:endParaRPr lang="de-DE" sz="2400" dirty="0">
+              <a:ln w="12700">
+                <a:noFill/>
+              </a:ln>
+              <a:solidFill>
+                <a:schemeClr val="bg1"/>
+              </a:solidFill>
+            </a:endParaRPr>
+          </a:p>
+        </p:txBody>
+      </p:sp>
+      <p:sp>
+        <p:nvSpPr>
+          <p:cNvPr id="26" name="Rechteck 25">
+            <a:extLst>
+              <a:ext uri="{FF2B5EF4-FFF2-40B4-BE49-F238E27FC236}">
+                <a16:creationId xmlns:a16="http://schemas.microsoft.com/office/drawing/2014/main" id="{509E1112-FF74-4CA2-B0CD-F1436BE20842}"/>
+              </a:ext>
+            </a:extLst>
+          </p:cNvPr>
+          <p:cNvSpPr/>
+          <p:nvPr/>
+        </p:nvSpPr>
+        <p:spPr>
+          <a:xfrm>
+            <a:off x="418012" y="3624398"/>
+            <a:ext cx="4739636" cy="1023155"/>
+          </a:xfrm>
+          <a:prstGeom prst="rect">
+            <a:avLst/>
+          </a:prstGeom>
+          <a:solidFill>
+            <a:srgbClr val="FF0000">
+              <a:alpha val="85000"/>
+            </a:srgbClr>
+          </a:solidFill>
+          <a:ln w="57150">
+            <a:solidFill>
+              <a:srgbClr val="C00000"/>
+            </a:solidFill>
+          </a:ln>
+        </p:spPr>
+        <p:style>
+          <a:lnRef idx="2">
+            <a:schemeClr val="accent1">
+              <a:shade val="50000"/>
+            </a:schemeClr>
+          </a:lnRef>
+          <a:fillRef idx="1">
+            <a:schemeClr val="accent1"/>
+          </a:fillRef>
+          <a:effectRef idx="0">
+            <a:schemeClr val="accent1"/>
+          </a:effectRef>
+          <a:fontRef idx="minor">
+            <a:schemeClr val="lt1"/>
+          </a:fontRef>
+        </p:style>
+        <p:txBody>
+          <a:bodyPr rtlCol="0" anchor="ctr"/>
+          <a:lstStyle/>
+          <a:p>
+            <a:pPr algn="ctr"/>
+            <a:r>
+              <a:rPr lang="en-US" sz="2400" dirty="0">
+                <a:ln w="12700">
+                  <a:noFill/>
+                </a:ln>
+                <a:solidFill>
+                  <a:schemeClr val="bg1"/>
+                </a:solidFill>
+              </a:rPr>
+              <a:t>GUI an den Controller </a:t>
+            </a:r>
+            <a:r>
+              <a:rPr lang="en-US" sz="2400" dirty="0" err="1">
+                <a:ln w="12700">
+                  <a:noFill/>
+                </a:ln>
+                <a:solidFill>
+                  <a:schemeClr val="bg1"/>
+                </a:solidFill>
+              </a:rPr>
+              <a:t>anbinden</a:t>
+            </a:r>
+            <a:endParaRPr lang="de-DE" sz="2400" dirty="0">
+              <a:ln w="12700">
+                <a:noFill/>
+              </a:ln>
+              <a:solidFill>
+                <a:schemeClr val="bg1"/>
+              </a:solidFill>
+            </a:endParaRPr>
+          </a:p>
+        </p:txBody>
+      </p:sp>
+      <p:sp>
+        <p:nvSpPr>
+          <p:cNvPr id="27" name="Rechteck 26">
+            <a:extLst>
+              <a:ext uri="{FF2B5EF4-FFF2-40B4-BE49-F238E27FC236}">
+                <a16:creationId xmlns:a16="http://schemas.microsoft.com/office/drawing/2014/main" id="{6DF8438C-1DEF-4F58-ADAF-3CDA70CBB149}"/>
+              </a:ext>
+            </a:extLst>
+          </p:cNvPr>
+          <p:cNvSpPr/>
+          <p:nvPr/>
+        </p:nvSpPr>
+        <p:spPr>
+          <a:xfrm>
+            <a:off x="6657701" y="2097178"/>
+            <a:ext cx="4872448" cy="2639778"/>
+          </a:xfrm>
+          <a:prstGeom prst="rect">
+            <a:avLst/>
+          </a:prstGeom>
+          <a:solidFill>
+            <a:srgbClr val="00B050">
+              <a:alpha val="75000"/>
+            </a:srgbClr>
+          </a:solidFill>
+          <a:ln w="31750">
+            <a:noFill/>
+          </a:ln>
+        </p:spPr>
+        <p:style>
+          <a:lnRef idx="2">
+            <a:schemeClr val="accent1">
+              <a:shade val="50000"/>
+            </a:schemeClr>
+          </a:lnRef>
+          <a:fillRef idx="1">
+            <a:schemeClr val="accent1"/>
+          </a:fillRef>
+          <a:effectRef idx="0">
+            <a:schemeClr val="accent1"/>
+          </a:effectRef>
+          <a:fontRef idx="minor">
+            <a:schemeClr val="lt1"/>
+          </a:fontRef>
+        </p:style>
+        <p:txBody>
+          <a:bodyPr rtlCol="0" anchor="ctr"/>
+          <a:lstStyle/>
+          <a:p>
+            <a:pPr algn="ctr"/>
+            <a:endParaRPr lang="de-DE" dirty="0">
+              <a:solidFill>
+                <a:schemeClr val="tx1"/>
+              </a:solidFill>
+            </a:endParaRPr>
+          </a:p>
+        </p:txBody>
+      </p:sp>
+      <p:grpSp>
+        <p:nvGrpSpPr>
+          <p:cNvPr id="29" name="Gruppieren 28">
+            <a:extLst>
+              <a:ext uri="{FF2B5EF4-FFF2-40B4-BE49-F238E27FC236}">
+                <a16:creationId xmlns:a16="http://schemas.microsoft.com/office/drawing/2014/main" id="{BA428B4A-44D3-456A-BB17-3034D5E83DE2}"/>
+              </a:ext>
+            </a:extLst>
+          </p:cNvPr>
+          <p:cNvGrpSpPr/>
+          <p:nvPr/>
+        </p:nvGrpSpPr>
+        <p:grpSpPr>
+          <a:xfrm>
+            <a:off x="1" y="6116680"/>
+            <a:ext cx="12176753" cy="741320"/>
+            <a:chOff x="1" y="6116680"/>
+            <a:chExt cx="12176753" cy="741320"/>
+          </a:xfrm>
+        </p:grpSpPr>
+        <p:sp>
+          <p:nvSpPr>
+            <p:cNvPr id="30" name="Rechteck 29">
+              <a:extLst>
+                <a:ext uri="{FF2B5EF4-FFF2-40B4-BE49-F238E27FC236}">
+                  <a16:creationId xmlns:a16="http://schemas.microsoft.com/office/drawing/2014/main" id="{103A2559-3AC2-4792-886C-00691A4A3F8C}"/>
+                </a:ext>
+              </a:extLst>
+            </p:cNvPr>
+            <p:cNvSpPr/>
+            <p:nvPr/>
+          </p:nvSpPr>
+          <p:spPr>
+            <a:xfrm>
+              <a:off x="1" y="6122126"/>
+              <a:ext cx="1976846" cy="735874"/>
+            </a:xfrm>
+            <a:prstGeom prst="rect">
+              <a:avLst/>
+            </a:prstGeom>
+            <a:solidFill>
+              <a:schemeClr val="bg1">
+                <a:lumMod val="85000"/>
+              </a:schemeClr>
+            </a:solidFill>
+            <a:ln w="31750">
+              <a:solidFill>
+                <a:schemeClr val="bg1">
+                  <a:lumMod val="50000"/>
+                </a:schemeClr>
+              </a:solidFill>
+            </a:ln>
+          </p:spPr>
+          <p:style>
+            <a:lnRef idx="2">
+              <a:schemeClr val="accent1">
+                <a:shade val="50000"/>
+              </a:schemeClr>
+            </a:lnRef>
+            <a:fillRef idx="1">
+              <a:schemeClr val="accent1"/>
+            </a:fillRef>
+            <a:effectRef idx="0">
+              <a:schemeClr val="accent1"/>
+            </a:effectRef>
+            <a:fontRef idx="minor">
+              <a:schemeClr val="lt1"/>
+            </a:fontRef>
+          </p:style>
+          <p:txBody>
+            <a:bodyPr rtlCol="0" anchor="ctr"/>
+            <a:lstStyle/>
+            <a:p>
+              <a:pPr algn="ctr"/>
+              <a:r>
+                <a:rPr lang="en-US" sz="2000" dirty="0" err="1">
+                  <a:solidFill>
+                    <a:schemeClr val="tx1"/>
+                  </a:solidFill>
+                </a:rPr>
+                <a:t>Hauptfenster</a:t>
+              </a:r>
+              <a:endParaRPr lang="de-DE" dirty="0">
+                <a:solidFill>
+                  <a:schemeClr val="tx1"/>
+                </a:solidFill>
+              </a:endParaRPr>
+            </a:p>
+          </p:txBody>
+        </p:sp>
+        <p:sp>
+          <p:nvSpPr>
+            <p:cNvPr id="31" name="Rechteck 30">
+              <a:extLst>
+                <a:ext uri="{FF2B5EF4-FFF2-40B4-BE49-F238E27FC236}">
+                  <a16:creationId xmlns:a16="http://schemas.microsoft.com/office/drawing/2014/main" id="{AD139D75-4947-4F6D-8980-4A39BDF31BBC}"/>
+                </a:ext>
+              </a:extLst>
+            </p:cNvPr>
+            <p:cNvSpPr/>
+            <p:nvPr/>
+          </p:nvSpPr>
+          <p:spPr>
+            <a:xfrm>
+              <a:off x="7713207" y="6116680"/>
+              <a:ext cx="4463547" cy="735874"/>
+            </a:xfrm>
+            <a:prstGeom prst="rect">
+              <a:avLst/>
+            </a:prstGeom>
+            <a:solidFill>
+              <a:schemeClr val="bg1">
+                <a:lumMod val="85000"/>
+              </a:schemeClr>
+            </a:solidFill>
+            <a:ln w="31750">
+              <a:solidFill>
+                <a:schemeClr val="bg1">
+                  <a:lumMod val="50000"/>
+                </a:schemeClr>
+              </a:solidFill>
+            </a:ln>
+          </p:spPr>
+          <p:style>
+            <a:lnRef idx="2">
+              <a:schemeClr val="accent1">
+                <a:shade val="50000"/>
+              </a:schemeClr>
+            </a:lnRef>
+            <a:fillRef idx="1">
+              <a:schemeClr val="accent1"/>
+            </a:fillRef>
+            <a:effectRef idx="0">
+              <a:schemeClr val="accent1"/>
+            </a:effectRef>
+            <a:fontRef idx="minor">
+              <a:schemeClr val="lt1"/>
+            </a:fontRef>
+          </p:style>
+          <p:txBody>
+            <a:bodyPr rtlCol="0" anchor="ctr"/>
+            <a:lstStyle/>
+            <a:p>
+              <a:pPr algn="ctr"/>
+              <a:r>
+                <a:rPr lang="en-US" sz="2000" dirty="0" err="1">
+                  <a:solidFill>
+                    <a:schemeClr val="tx1"/>
+                  </a:solidFill>
+                </a:rPr>
+                <a:t>Konfigurationsfeld</a:t>
+              </a:r>
+              <a:endParaRPr lang="de-DE" dirty="0">
+                <a:solidFill>
+                  <a:schemeClr val="tx1"/>
+                </a:solidFill>
+              </a:endParaRPr>
+            </a:p>
+          </p:txBody>
+        </p:sp>
+        <p:sp>
+          <p:nvSpPr>
+            <p:cNvPr id="32" name="Rechteck 31">
+              <a:extLst>
+                <a:ext uri="{FF2B5EF4-FFF2-40B4-BE49-F238E27FC236}">
+                  <a16:creationId xmlns:a16="http://schemas.microsoft.com/office/drawing/2014/main" id="{00983E87-01C3-4B74-BA83-2405C4C4DB82}"/>
+                </a:ext>
+              </a:extLst>
+            </p:cNvPr>
+            <p:cNvSpPr/>
+            <p:nvPr/>
+          </p:nvSpPr>
+          <p:spPr>
+            <a:xfrm>
+              <a:off x="4864142" y="6122126"/>
+              <a:ext cx="2887295" cy="735874"/>
+            </a:xfrm>
+            <a:prstGeom prst="rect">
+              <a:avLst/>
+            </a:prstGeom>
+            <a:solidFill>
+              <a:schemeClr val="bg1">
+                <a:lumMod val="85000"/>
+              </a:schemeClr>
+            </a:solidFill>
+            <a:ln w="31750">
+              <a:solidFill>
+                <a:schemeClr val="bg1">
+                  <a:lumMod val="50000"/>
+                </a:schemeClr>
+              </a:solidFill>
+            </a:ln>
+          </p:spPr>
+          <p:style>
+            <a:lnRef idx="2">
+              <a:schemeClr val="accent1">
+                <a:shade val="50000"/>
+              </a:schemeClr>
+            </a:lnRef>
+            <a:fillRef idx="1">
+              <a:schemeClr val="accent1"/>
+            </a:fillRef>
+            <a:effectRef idx="0">
+              <a:schemeClr val="accent1"/>
+            </a:effectRef>
+            <a:fontRef idx="minor">
+              <a:schemeClr val="lt1"/>
+            </a:fontRef>
+          </p:style>
+          <p:txBody>
+            <a:bodyPr rtlCol="0" anchor="ctr"/>
+            <a:lstStyle/>
+            <a:p>
+              <a:pPr algn="ctr"/>
+              <a:r>
+                <a:rPr lang="en-US" sz="2000" dirty="0" err="1">
+                  <a:solidFill>
+                    <a:schemeClr val="tx1"/>
+                  </a:solidFill>
+                </a:rPr>
+                <a:t>Prototypenfeld</a:t>
+              </a:r>
+              <a:endParaRPr lang="de-DE" dirty="0">
+                <a:solidFill>
+                  <a:schemeClr val="tx1"/>
+                </a:solidFill>
+              </a:endParaRPr>
+            </a:p>
+          </p:txBody>
+        </p:sp>
+        <p:sp>
+          <p:nvSpPr>
+            <p:cNvPr id="33" name="Rechteck 32">
+              <a:extLst>
+                <a:ext uri="{FF2B5EF4-FFF2-40B4-BE49-F238E27FC236}">
+                  <a16:creationId xmlns:a16="http://schemas.microsoft.com/office/drawing/2014/main" id="{E3A5042C-C64F-4A80-BAD0-D14AD3281CC6}"/>
+                </a:ext>
+              </a:extLst>
+            </p:cNvPr>
+            <p:cNvSpPr/>
+            <p:nvPr/>
+          </p:nvSpPr>
+          <p:spPr>
+            <a:xfrm>
+              <a:off x="1976847" y="6119949"/>
+              <a:ext cx="2887295" cy="735874"/>
+            </a:xfrm>
+            <a:prstGeom prst="rect">
+              <a:avLst/>
+            </a:prstGeom>
+            <a:solidFill>
+              <a:schemeClr val="bg1">
+                <a:lumMod val="85000"/>
+              </a:schemeClr>
+            </a:solidFill>
+            <a:ln w="31750">
+              <a:solidFill>
+                <a:schemeClr val="bg1">
+                  <a:lumMod val="50000"/>
+                </a:schemeClr>
+              </a:solidFill>
+            </a:ln>
+          </p:spPr>
+          <p:style>
+            <a:lnRef idx="2">
+              <a:schemeClr val="accent1">
+                <a:shade val="50000"/>
+              </a:schemeClr>
+            </a:lnRef>
+            <a:fillRef idx="1">
+              <a:schemeClr val="accent1"/>
+            </a:fillRef>
+            <a:effectRef idx="0">
+              <a:schemeClr val="accent1"/>
+            </a:effectRef>
+            <a:fontRef idx="minor">
+              <a:schemeClr val="lt1"/>
+            </a:fontRef>
+          </p:style>
+          <p:txBody>
+            <a:bodyPr rtlCol="0" anchor="ctr"/>
+            <a:lstStyle/>
+            <a:p>
+              <a:pPr algn="ctr"/>
+              <a:r>
+                <a:rPr lang="en-US" sz="2000" dirty="0" err="1">
+                  <a:solidFill>
+                    <a:schemeClr val="tx1"/>
+                  </a:solidFill>
+                </a:rPr>
+                <a:t>Menü</a:t>
+              </a:r>
+              <a:endParaRPr lang="de-DE" dirty="0">
+                <a:solidFill>
+                  <a:schemeClr val="tx1"/>
+                </a:solidFill>
+              </a:endParaRPr>
+            </a:p>
+          </p:txBody>
+        </p:sp>
+      </p:grpSp>
+      <p:sp>
+        <p:nvSpPr>
+          <p:cNvPr id="34" name="Rechteck 33">
+            <a:extLst>
+              <a:ext uri="{FF2B5EF4-FFF2-40B4-BE49-F238E27FC236}">
+                <a16:creationId xmlns:a16="http://schemas.microsoft.com/office/drawing/2014/main" id="{C4975F59-B150-4593-90D4-3CE067EE16DB}"/>
+              </a:ext>
+            </a:extLst>
+          </p:cNvPr>
+          <p:cNvSpPr/>
+          <p:nvPr/>
+        </p:nvSpPr>
+        <p:spPr>
+          <a:xfrm>
+            <a:off x="4864141" y="6150430"/>
+            <a:ext cx="7312613" cy="731517"/>
+          </a:xfrm>
+          <a:prstGeom prst="rect">
+            <a:avLst/>
+          </a:prstGeom>
+          <a:solidFill>
+            <a:schemeClr val="bg1">
+              <a:alpha val="80000"/>
+            </a:schemeClr>
+          </a:solidFill>
+          <a:ln w="31750">
+            <a:noFill/>
+          </a:ln>
+        </p:spPr>
+        <p:style>
+          <a:lnRef idx="2">
+            <a:schemeClr val="accent1">
+              <a:shade val="50000"/>
+            </a:schemeClr>
+          </a:lnRef>
+          <a:fillRef idx="1">
+            <a:schemeClr val="accent1"/>
+          </a:fillRef>
+          <a:effectRef idx="0">
+            <a:schemeClr val="accent1"/>
+          </a:effectRef>
+          <a:fontRef idx="minor">
+            <a:schemeClr val="lt1"/>
+          </a:fontRef>
+        </p:style>
+        <p:txBody>
+          <a:bodyPr rtlCol="0" anchor="ctr"/>
+          <a:lstStyle/>
+          <a:p>
+            <a:pPr algn="ctr"/>
+            <a:endParaRPr lang="de-DE" dirty="0">
+              <a:solidFill>
+                <a:schemeClr val="tx1"/>
+              </a:solidFill>
+            </a:endParaRPr>
+          </a:p>
+        </p:txBody>
+      </p:sp>
+      <p:sp>
+        <p:nvSpPr>
+          <p:cNvPr id="35" name="Rechteck 34">
+            <a:extLst>
+              <a:ext uri="{FF2B5EF4-FFF2-40B4-BE49-F238E27FC236}">
+                <a16:creationId xmlns:a16="http://schemas.microsoft.com/office/drawing/2014/main" id="{79124AC8-6B06-4170-876A-5DA713C08B30}"/>
+              </a:ext>
+            </a:extLst>
+          </p:cNvPr>
+          <p:cNvSpPr/>
+          <p:nvPr/>
+        </p:nvSpPr>
+        <p:spPr>
+          <a:xfrm>
+            <a:off x="-30474" y="6122123"/>
+            <a:ext cx="1976848" cy="735878"/>
+          </a:xfrm>
+          <a:prstGeom prst="rect">
+            <a:avLst/>
+          </a:prstGeom>
+          <a:solidFill>
+            <a:schemeClr val="bg1">
+              <a:alpha val="80000"/>
+            </a:schemeClr>
+          </a:solidFill>
+          <a:ln w="31750">
+            <a:noFill/>
+          </a:ln>
+        </p:spPr>
+        <p:style>
+          <a:lnRef idx="2">
+            <a:schemeClr val="accent1">
+              <a:shade val="50000"/>
+            </a:schemeClr>
+          </a:lnRef>
+          <a:fillRef idx="1">
+            <a:schemeClr val="accent1"/>
+          </a:fillRef>
+          <a:effectRef idx="0">
+            <a:schemeClr val="accent1"/>
+          </a:effectRef>
+          <a:fontRef idx="minor">
+            <a:schemeClr val="lt1"/>
+          </a:fontRef>
+        </p:style>
+        <p:txBody>
+          <a:bodyPr rtlCol="0" anchor="ctr"/>
+          <a:lstStyle/>
+          <a:p>
+            <a:pPr algn="ctr"/>
+            <a:endParaRPr lang="de-DE" dirty="0">
+              <a:solidFill>
+                <a:schemeClr val="tx1"/>
+              </a:solidFill>
+            </a:endParaRPr>
+          </a:p>
+        </p:txBody>
+      </p:sp>
     </p:spTree>
     <p:extLst>
       <p:ext uri="{BB962C8B-B14F-4D97-AF65-F5344CB8AC3E}">
-        <p14:creationId xmlns:p14="http://schemas.microsoft.com/office/powerpoint/2010/main" val="3403557114"/>
+        <p14:creationId xmlns:p14="http://schemas.microsoft.com/office/powerpoint/2010/main" val="4223165388"/>
       </p:ext>
     </p:extLst>
   </p:cSld>
@@ -5408,298 +6405,6 @@
       </p:sp>
       <p:sp>
         <p:nvSpPr>
-          <p:cNvPr id="5" name="Rechteck 4">
-            <a:extLst>
-              <a:ext uri="{FF2B5EF4-FFF2-40B4-BE49-F238E27FC236}">
-                <a16:creationId xmlns:a16="http://schemas.microsoft.com/office/drawing/2014/main" id="{F8D33603-EE5F-46B7-8B5E-60A82565FB28}"/>
-              </a:ext>
-            </a:extLst>
-          </p:cNvPr>
-          <p:cNvSpPr/>
-          <p:nvPr/>
-        </p:nvSpPr>
-        <p:spPr>
-          <a:xfrm>
-            <a:off x="0" y="6122126"/>
-            <a:ext cx="4171406" cy="735874"/>
-          </a:xfrm>
-          <a:prstGeom prst="rect">
-            <a:avLst/>
-          </a:prstGeom>
-          <a:solidFill>
-            <a:schemeClr val="bg1">
-              <a:lumMod val="85000"/>
-            </a:schemeClr>
-          </a:solidFill>
-          <a:ln w="31750">
-            <a:solidFill>
-              <a:schemeClr val="bg1">
-                <a:lumMod val="50000"/>
-              </a:schemeClr>
-            </a:solidFill>
-          </a:ln>
-        </p:spPr>
-        <p:style>
-          <a:lnRef idx="2">
-            <a:schemeClr val="accent1">
-              <a:shade val="50000"/>
-            </a:schemeClr>
-          </a:lnRef>
-          <a:fillRef idx="1">
-            <a:schemeClr val="accent1"/>
-          </a:fillRef>
-          <a:effectRef idx="0">
-            <a:schemeClr val="accent1"/>
-          </a:effectRef>
-          <a:fontRef idx="minor">
-            <a:schemeClr val="lt1"/>
-          </a:fontRef>
-        </p:style>
-        <p:txBody>
-          <a:bodyPr rtlCol="0" anchor="ctr"/>
-          <a:lstStyle/>
-          <a:p>
-            <a:pPr algn="ctr"/>
-            <a:r>
-              <a:rPr lang="en-US" sz="2000" dirty="0" err="1">
-                <a:solidFill>
-                  <a:schemeClr val="tx1"/>
-                </a:solidFill>
-              </a:rPr>
-              <a:t>Hauptfenster</a:t>
-            </a:r>
-            <a:endParaRPr lang="de-DE" dirty="0">
-              <a:solidFill>
-                <a:schemeClr val="tx1"/>
-              </a:solidFill>
-            </a:endParaRPr>
-          </a:p>
-        </p:txBody>
-      </p:sp>
-      <p:sp>
-        <p:nvSpPr>
-          <p:cNvPr id="6" name="Rechteck 5">
-            <a:extLst>
-              <a:ext uri="{FF2B5EF4-FFF2-40B4-BE49-F238E27FC236}">
-                <a16:creationId xmlns:a16="http://schemas.microsoft.com/office/drawing/2014/main" id="{BB0B3755-5F21-48E5-988A-183FA40BE993}"/>
-              </a:ext>
-            </a:extLst>
-          </p:cNvPr>
-          <p:cNvSpPr/>
-          <p:nvPr/>
-        </p:nvSpPr>
-        <p:spPr>
-          <a:xfrm>
-            <a:off x="4171406" y="6122126"/>
-            <a:ext cx="4119154" cy="735874"/>
-          </a:xfrm>
-          <a:prstGeom prst="rect">
-            <a:avLst/>
-          </a:prstGeom>
-          <a:solidFill>
-            <a:schemeClr val="bg1">
-              <a:lumMod val="85000"/>
-            </a:schemeClr>
-          </a:solidFill>
-          <a:ln w="31750">
-            <a:solidFill>
-              <a:schemeClr val="bg1">
-                <a:lumMod val="50000"/>
-              </a:schemeClr>
-            </a:solidFill>
-          </a:ln>
-        </p:spPr>
-        <p:style>
-          <a:lnRef idx="2">
-            <a:schemeClr val="accent1">
-              <a:shade val="50000"/>
-            </a:schemeClr>
-          </a:lnRef>
-          <a:fillRef idx="1">
-            <a:schemeClr val="accent1"/>
-          </a:fillRef>
-          <a:effectRef idx="0">
-            <a:schemeClr val="accent1"/>
-          </a:effectRef>
-          <a:fontRef idx="minor">
-            <a:schemeClr val="lt1"/>
-          </a:fontRef>
-        </p:style>
-        <p:txBody>
-          <a:bodyPr rtlCol="0" anchor="ctr"/>
-          <a:lstStyle/>
-          <a:p>
-            <a:pPr algn="ctr"/>
-            <a:r>
-              <a:rPr lang="en-US" sz="2000" dirty="0" err="1">
-                <a:solidFill>
-                  <a:schemeClr val="tx1"/>
-                </a:solidFill>
-              </a:rPr>
-              <a:t>Konfigurationsfeld</a:t>
-            </a:r>
-            <a:endParaRPr lang="de-DE" dirty="0">
-              <a:solidFill>
-                <a:schemeClr val="tx1"/>
-              </a:solidFill>
-            </a:endParaRPr>
-          </a:p>
-        </p:txBody>
-      </p:sp>
-      <p:sp>
-        <p:nvSpPr>
-          <p:cNvPr id="7" name="Rechteck 6">
-            <a:extLst>
-              <a:ext uri="{FF2B5EF4-FFF2-40B4-BE49-F238E27FC236}">
-                <a16:creationId xmlns:a16="http://schemas.microsoft.com/office/drawing/2014/main" id="{62C82B8B-BE55-4729-B09E-417C0AE0DE93}"/>
-              </a:ext>
-            </a:extLst>
-          </p:cNvPr>
-          <p:cNvSpPr/>
-          <p:nvPr/>
-        </p:nvSpPr>
-        <p:spPr>
-          <a:xfrm>
-            <a:off x="8290560" y="6122126"/>
-            <a:ext cx="3901440" cy="735874"/>
-          </a:xfrm>
-          <a:prstGeom prst="rect">
-            <a:avLst/>
-          </a:prstGeom>
-          <a:solidFill>
-            <a:schemeClr val="bg1">
-              <a:lumMod val="85000"/>
-            </a:schemeClr>
-          </a:solidFill>
-          <a:ln w="31750">
-            <a:solidFill>
-              <a:schemeClr val="bg1">
-                <a:lumMod val="50000"/>
-              </a:schemeClr>
-            </a:solidFill>
-          </a:ln>
-        </p:spPr>
-        <p:style>
-          <a:lnRef idx="2">
-            <a:schemeClr val="accent1">
-              <a:shade val="50000"/>
-            </a:schemeClr>
-          </a:lnRef>
-          <a:fillRef idx="1">
-            <a:schemeClr val="accent1"/>
-          </a:fillRef>
-          <a:effectRef idx="0">
-            <a:schemeClr val="accent1"/>
-          </a:effectRef>
-          <a:fontRef idx="minor">
-            <a:schemeClr val="lt1"/>
-          </a:fontRef>
-        </p:style>
-        <p:txBody>
-          <a:bodyPr rtlCol="0" anchor="ctr"/>
-          <a:lstStyle/>
-          <a:p>
-            <a:pPr algn="ctr"/>
-            <a:r>
-              <a:rPr lang="en-US" sz="2000" dirty="0">
-                <a:solidFill>
-                  <a:schemeClr val="tx1"/>
-                </a:solidFill>
-              </a:rPr>
-              <a:t>Editor </a:t>
-            </a:r>
-            <a:r>
-              <a:rPr lang="en-US" sz="2000" dirty="0" err="1">
-                <a:solidFill>
-                  <a:schemeClr val="tx1"/>
-                </a:solidFill>
-              </a:rPr>
-              <a:t>für</a:t>
-            </a:r>
-            <a:r>
-              <a:rPr lang="en-US" sz="2000" dirty="0">
-                <a:solidFill>
-                  <a:schemeClr val="tx1"/>
-                </a:solidFill>
-              </a:rPr>
-              <a:t> </a:t>
-            </a:r>
-            <a:r>
-              <a:rPr lang="en-US" sz="2000" dirty="0" err="1">
-                <a:solidFill>
-                  <a:schemeClr val="tx1"/>
-                </a:solidFill>
-              </a:rPr>
-              <a:t>Konfigurationen</a:t>
-            </a:r>
-            <a:endParaRPr lang="de-DE" dirty="0">
-              <a:solidFill>
-                <a:schemeClr val="tx1"/>
-              </a:solidFill>
-            </a:endParaRPr>
-          </a:p>
-        </p:txBody>
-      </p:sp>
-      <p:sp>
-        <p:nvSpPr>
-          <p:cNvPr id="9" name="Rechteck 8">
-            <a:extLst>
-              <a:ext uri="{FF2B5EF4-FFF2-40B4-BE49-F238E27FC236}">
-                <a16:creationId xmlns:a16="http://schemas.microsoft.com/office/drawing/2014/main" id="{81AF1F01-DE57-4926-B2A4-A4CCC4CDB337}"/>
-              </a:ext>
-            </a:extLst>
-          </p:cNvPr>
-          <p:cNvSpPr/>
-          <p:nvPr/>
-        </p:nvSpPr>
-        <p:spPr>
-          <a:xfrm>
-            <a:off x="8304707" y="5982796"/>
-            <a:ext cx="4078881" cy="1193067"/>
-          </a:xfrm>
-          <a:prstGeom prst="rect">
-            <a:avLst/>
-          </a:prstGeom>
-          <a:solidFill>
-            <a:schemeClr val="bg1">
-              <a:alpha val="80000"/>
-            </a:schemeClr>
-          </a:solidFill>
-          <a:ln w="31750">
-            <a:noFill/>
-          </a:ln>
-        </p:spPr>
-        <p:style>
-          <a:lnRef idx="2">
-            <a:schemeClr val="accent1">
-              <a:shade val="50000"/>
-            </a:schemeClr>
-          </a:lnRef>
-          <a:fillRef idx="1">
-            <a:schemeClr val="accent1"/>
-          </a:fillRef>
-          <a:effectRef idx="0">
-            <a:schemeClr val="accent1"/>
-          </a:effectRef>
-          <a:fontRef idx="minor">
-            <a:schemeClr val="lt1"/>
-          </a:fontRef>
-        </p:style>
-        <p:txBody>
-          <a:bodyPr rtlCol="0" anchor="ctr"/>
-          <a:lstStyle/>
-          <a:p>
-            <a:pPr algn="ctr"/>
-            <a:endParaRPr lang="de-DE" dirty="0">
-              <a:solidFill>
-                <a:schemeClr val="tx1"/>
-              </a:solidFill>
-            </a:endParaRPr>
-          </a:p>
-        </p:txBody>
-      </p:sp>
-      <p:sp>
-        <p:nvSpPr>
           <p:cNvPr id="10" name="Rechteck 9">
             <a:extLst>
               <a:ext uri="{FF2B5EF4-FFF2-40B4-BE49-F238E27FC236}">
@@ -5749,84 +6454,6 @@
             <a:endParaRPr lang="de-DE" dirty="0">
               <a:solidFill>
                 <a:schemeClr val="tx1"/>
-              </a:solidFill>
-            </a:endParaRPr>
-          </a:p>
-        </p:txBody>
-      </p:sp>
-      <p:sp>
-        <p:nvSpPr>
-          <p:cNvPr id="11" name="Rechteck 10">
-            <a:extLst>
-              <a:ext uri="{FF2B5EF4-FFF2-40B4-BE49-F238E27FC236}">
-                <a16:creationId xmlns:a16="http://schemas.microsoft.com/office/drawing/2014/main" id="{125161CD-7200-4107-A0C1-710F35774DC9}"/>
-              </a:ext>
-            </a:extLst>
-          </p:cNvPr>
-          <p:cNvSpPr/>
-          <p:nvPr/>
-        </p:nvSpPr>
-        <p:spPr>
-          <a:xfrm>
-            <a:off x="8707" y="0"/>
-            <a:ext cx="1114699" cy="1027611"/>
-          </a:xfrm>
-          <a:prstGeom prst="rect">
-            <a:avLst/>
-          </a:prstGeom>
-          <a:solidFill>
-            <a:schemeClr val="tx1"/>
-          </a:solidFill>
-          <a:ln w="31750">
-            <a:solidFill>
-              <a:schemeClr val="tx1"/>
-            </a:solidFill>
-            <a:round/>
-          </a:ln>
-        </p:spPr>
-        <p:style>
-          <a:lnRef idx="2">
-            <a:schemeClr val="accent1">
-              <a:shade val="50000"/>
-            </a:schemeClr>
-          </a:lnRef>
-          <a:fillRef idx="1">
-            <a:schemeClr val="accent1"/>
-          </a:fillRef>
-          <a:effectRef idx="0">
-            <a:schemeClr val="accent1"/>
-          </a:effectRef>
-          <a:fontRef idx="minor">
-            <a:schemeClr val="lt1"/>
-          </a:fontRef>
-        </p:style>
-        <p:txBody>
-          <a:bodyPr rtlCol="0" anchor="ctr"/>
-          <a:lstStyle/>
-          <a:p>
-            <a:pPr algn="ctr"/>
-            <a:r>
-              <a:rPr lang="en-US" sz="3200" dirty="0">
-                <a:solidFill>
-                  <a:schemeClr val="bg1"/>
-                </a:solidFill>
-              </a:rPr>
-              <a:t>IST</a:t>
-            </a:r>
-          </a:p>
-          <a:p>
-            <a:pPr algn="ctr"/>
-            <a:r>
-              <a:rPr lang="en-US" dirty="0" err="1">
-                <a:solidFill>
-                  <a:schemeClr val="bg1"/>
-                </a:solidFill>
-              </a:rPr>
-              <a:t>Zustand</a:t>
-            </a:r>
-            <a:endParaRPr lang="de-DE" dirty="0">
-              <a:solidFill>
-                <a:schemeClr val="bg1"/>
               </a:solidFill>
             </a:endParaRPr>
           </a:p>
@@ -6376,12 +7003,83 @@
           </a:p>
         </p:txBody>
       </p:sp>
+      <p:pic>
+        <p:nvPicPr>
+          <p:cNvPr id="23" name="Grafik 22" descr="Ein Bild, das Screenshot, Person enthält.&#10;&#10;Automatisch generierte Beschreibung">
+            <a:extLst>
+              <a:ext uri="{FF2B5EF4-FFF2-40B4-BE49-F238E27FC236}">
+                <a16:creationId xmlns:a16="http://schemas.microsoft.com/office/drawing/2014/main" id="{A77C6971-5A46-49EF-8C3F-3811569D94F5}"/>
+              </a:ext>
+            </a:extLst>
+          </p:cNvPr>
+          <p:cNvPicPr>
+            <a:picLocks noChangeAspect="1"/>
+          </p:cNvPicPr>
+          <p:nvPr/>
+        </p:nvPicPr>
+        <p:blipFill rotWithShape="1">
+          <a:blip r:embed="rId2">
+            <a:extLst>
+              <a:ext uri="{28A0092B-C50C-407E-A947-70E740481C1C}">
+                <a14:useLocalDpi xmlns:a14="http://schemas.microsoft.com/office/drawing/2010/main" val="0"/>
+              </a:ext>
+            </a:extLst>
+          </a:blip>
+          <a:srcRect t="21185" b="47194"/>
+          <a:stretch/>
+        </p:blipFill>
+        <p:spPr>
+          <a:xfrm>
+            <a:off x="1504408" y="251189"/>
+            <a:ext cx="3832441" cy="654902"/>
+          </a:xfrm>
+          <a:prstGeom prst="rect">
+            <a:avLst/>
+          </a:prstGeom>
+        </p:spPr>
+      </p:pic>
+      <p:pic>
+        <p:nvPicPr>
+          <p:cNvPr id="25" name="Grafik 24">
+            <a:extLst>
+              <a:ext uri="{FF2B5EF4-FFF2-40B4-BE49-F238E27FC236}">
+                <a16:creationId xmlns:a16="http://schemas.microsoft.com/office/drawing/2014/main" id="{BDF802CE-5597-4B4F-A148-D9CCFB86CE7A}"/>
+              </a:ext>
+            </a:extLst>
+          </p:cNvPr>
+          <p:cNvPicPr>
+            <a:picLocks noChangeAspect="1"/>
+          </p:cNvPicPr>
+          <p:nvPr/>
+        </p:nvPicPr>
+        <p:blipFill>
+          <a:blip r:embed="rId3">
+            <a:extLst>
+              <a:ext uri="{28A0092B-C50C-407E-A947-70E740481C1C}">
+                <a14:useLocalDpi xmlns:a14="http://schemas.microsoft.com/office/drawing/2010/main" val="0"/>
+              </a:ext>
+            </a:extLst>
+          </a:blip>
+          <a:stretch>
+            <a:fillRect/>
+          </a:stretch>
+        </p:blipFill>
+        <p:spPr>
+          <a:xfrm>
+            <a:off x="6757596" y="1898010"/>
+            <a:ext cx="4480000" cy="2520000"/>
+          </a:xfrm>
+          <a:prstGeom prst="rect">
+            <a:avLst/>
+          </a:prstGeom>
+        </p:spPr>
+      </p:pic>
       <p:sp>
         <p:nvSpPr>
           <p:cNvPr id="21" name="Rechteck 20">
             <a:extLst>
               <a:ext uri="{FF2B5EF4-FFF2-40B4-BE49-F238E27FC236}">
-                <a16:creationId xmlns:a16="http://schemas.microsoft.com/office/drawing/2014/main" id="{21A2810D-9925-405D-9641-8F29A6690508}"/>
+                <a16:creationId xmlns:a16="http://schemas.microsoft.com/office/drawing/2014/main" id="{7A579CC3-04C1-448E-88E5-E52C96DA0417}"/>
               </a:ext>
             </a:extLst>
           </p:cNvPr>
@@ -6390,8 +7088,761 @@
         </p:nvSpPr>
         <p:spPr>
           <a:xfrm>
-            <a:off x="-16331" y="6148255"/>
-            <a:ext cx="4161611" cy="1193067"/>
+            <a:off x="17416" y="13464"/>
+            <a:ext cx="1114699" cy="1027611"/>
+          </a:xfrm>
+          <a:prstGeom prst="rect">
+            <a:avLst/>
+          </a:prstGeom>
+          <a:solidFill>
+            <a:schemeClr val="tx1"/>
+          </a:solidFill>
+          <a:ln w="31750">
+            <a:solidFill>
+              <a:schemeClr val="tx1"/>
+            </a:solidFill>
+            <a:round/>
+          </a:ln>
+        </p:spPr>
+        <p:style>
+          <a:lnRef idx="2">
+            <a:schemeClr val="accent1">
+              <a:shade val="50000"/>
+            </a:schemeClr>
+          </a:lnRef>
+          <a:fillRef idx="1">
+            <a:schemeClr val="accent1"/>
+          </a:fillRef>
+          <a:effectRef idx="0">
+            <a:schemeClr val="accent1"/>
+          </a:effectRef>
+          <a:fontRef idx="minor">
+            <a:schemeClr val="lt1"/>
+          </a:fontRef>
+        </p:style>
+        <p:txBody>
+          <a:bodyPr rtlCol="0" anchor="ctr"/>
+          <a:lstStyle/>
+          <a:p>
+            <a:pPr algn="ctr"/>
+            <a:r>
+              <a:rPr lang="en-US" sz="3200" dirty="0" err="1">
+                <a:solidFill>
+                  <a:schemeClr val="bg1"/>
+                </a:solidFill>
+              </a:rPr>
+              <a:t>ToDo</a:t>
+            </a:r>
+            <a:endParaRPr lang="en-US" sz="3200" dirty="0">
+              <a:solidFill>
+                <a:schemeClr val="bg1"/>
+              </a:solidFill>
+            </a:endParaRPr>
+          </a:p>
+        </p:txBody>
+      </p:sp>
+      <p:sp>
+        <p:nvSpPr>
+          <p:cNvPr id="22" name="Rechteck 21">
+            <a:extLst>
+              <a:ext uri="{FF2B5EF4-FFF2-40B4-BE49-F238E27FC236}">
+                <a16:creationId xmlns:a16="http://schemas.microsoft.com/office/drawing/2014/main" id="{250F1B95-91D0-43CE-821E-4DBFBDD99B87}"/>
+              </a:ext>
+            </a:extLst>
+          </p:cNvPr>
+          <p:cNvSpPr/>
+          <p:nvPr/>
+        </p:nvSpPr>
+        <p:spPr>
+          <a:xfrm>
+            <a:off x="463731" y="1924829"/>
+            <a:ext cx="4470758" cy="936170"/>
+          </a:xfrm>
+          <a:prstGeom prst="rect">
+            <a:avLst/>
+          </a:prstGeom>
+          <a:solidFill>
+            <a:srgbClr val="FF0000">
+              <a:alpha val="85000"/>
+            </a:srgbClr>
+          </a:solidFill>
+          <a:ln w="57150">
+            <a:solidFill>
+              <a:srgbClr val="C00000"/>
+            </a:solidFill>
+          </a:ln>
+        </p:spPr>
+        <p:style>
+          <a:lnRef idx="2">
+            <a:schemeClr val="accent1">
+              <a:shade val="50000"/>
+            </a:schemeClr>
+          </a:lnRef>
+          <a:fillRef idx="1">
+            <a:schemeClr val="accent1"/>
+          </a:fillRef>
+          <a:effectRef idx="0">
+            <a:schemeClr val="accent1"/>
+          </a:effectRef>
+          <a:fontRef idx="minor">
+            <a:schemeClr val="lt1"/>
+          </a:fontRef>
+        </p:style>
+        <p:txBody>
+          <a:bodyPr rtlCol="0" anchor="ctr"/>
+          <a:lstStyle/>
+          <a:p>
+            <a:pPr algn="ctr"/>
+            <a:r>
+              <a:rPr lang="en-US" sz="2400" dirty="0">
+                <a:ln w="12700">
+                  <a:noFill/>
+                </a:ln>
+                <a:solidFill>
+                  <a:schemeClr val="bg1"/>
+                </a:solidFill>
+              </a:rPr>
+              <a:t>YAML Input </a:t>
+            </a:r>
+            <a:r>
+              <a:rPr lang="en-US" sz="2400" dirty="0" err="1">
+                <a:ln w="12700">
+                  <a:noFill/>
+                </a:ln>
+                <a:solidFill>
+                  <a:schemeClr val="bg1"/>
+                </a:solidFill>
+              </a:rPr>
+              <a:t>vom</a:t>
+            </a:r>
+            <a:r>
+              <a:rPr lang="en-US" sz="2400" dirty="0">
+                <a:ln w="12700">
+                  <a:noFill/>
+                </a:ln>
+                <a:solidFill>
+                  <a:schemeClr val="bg1"/>
+                </a:solidFill>
+              </a:rPr>
+              <a:t> Backend </a:t>
+            </a:r>
+            <a:r>
+              <a:rPr lang="en-US" sz="2400" dirty="0" err="1">
+                <a:ln w="12700">
+                  <a:noFill/>
+                </a:ln>
+                <a:solidFill>
+                  <a:schemeClr val="bg1"/>
+                </a:solidFill>
+              </a:rPr>
+              <a:t>darstellen</a:t>
+            </a:r>
+            <a:endParaRPr lang="de-DE" sz="2400" dirty="0">
+              <a:ln w="12700">
+                <a:noFill/>
+              </a:ln>
+              <a:solidFill>
+                <a:schemeClr val="bg1"/>
+              </a:solidFill>
+            </a:endParaRPr>
+          </a:p>
+        </p:txBody>
+      </p:sp>
+      <p:sp>
+        <p:nvSpPr>
+          <p:cNvPr id="24" name="Rechteck 23">
+            <a:extLst>
+              <a:ext uri="{FF2B5EF4-FFF2-40B4-BE49-F238E27FC236}">
+                <a16:creationId xmlns:a16="http://schemas.microsoft.com/office/drawing/2014/main" id="{06471D0C-F1F0-4774-B2F2-B241F838269B}"/>
+              </a:ext>
+            </a:extLst>
+          </p:cNvPr>
+          <p:cNvSpPr/>
+          <p:nvPr/>
+        </p:nvSpPr>
+        <p:spPr>
+          <a:xfrm>
+            <a:off x="463731" y="3548741"/>
+            <a:ext cx="4470758" cy="936170"/>
+          </a:xfrm>
+          <a:prstGeom prst="rect">
+            <a:avLst/>
+          </a:prstGeom>
+          <a:solidFill>
+            <a:srgbClr val="FF0000">
+              <a:alpha val="85000"/>
+            </a:srgbClr>
+          </a:solidFill>
+          <a:ln w="57150">
+            <a:solidFill>
+              <a:srgbClr val="C00000"/>
+            </a:solidFill>
+          </a:ln>
+        </p:spPr>
+        <p:style>
+          <a:lnRef idx="2">
+            <a:schemeClr val="accent1">
+              <a:shade val="50000"/>
+            </a:schemeClr>
+          </a:lnRef>
+          <a:fillRef idx="1">
+            <a:schemeClr val="accent1"/>
+          </a:fillRef>
+          <a:effectRef idx="0">
+            <a:schemeClr val="accent1"/>
+          </a:effectRef>
+          <a:fontRef idx="minor">
+            <a:schemeClr val="lt1"/>
+          </a:fontRef>
+        </p:style>
+        <p:txBody>
+          <a:bodyPr rtlCol="0" anchor="ctr"/>
+          <a:lstStyle/>
+          <a:p>
+            <a:pPr algn="ctr"/>
+            <a:r>
+              <a:rPr lang="en-US" sz="2400" dirty="0" err="1">
+                <a:ln w="12700">
+                  <a:noFill/>
+                </a:ln>
+                <a:solidFill>
+                  <a:schemeClr val="bg1"/>
+                </a:solidFill>
+              </a:rPr>
+              <a:t>Optionen</a:t>
+            </a:r>
+            <a:r>
+              <a:rPr lang="en-US" sz="2400" dirty="0">
+                <a:ln w="12700">
+                  <a:noFill/>
+                </a:ln>
+                <a:solidFill>
+                  <a:schemeClr val="bg1"/>
+                </a:solidFill>
+              </a:rPr>
+              <a:t> </a:t>
+            </a:r>
+            <a:r>
+              <a:rPr lang="en-US" sz="2400" dirty="0" err="1">
+                <a:ln w="12700">
+                  <a:noFill/>
+                </a:ln>
+                <a:solidFill>
+                  <a:schemeClr val="bg1"/>
+                </a:solidFill>
+              </a:rPr>
+              <a:t>zum</a:t>
+            </a:r>
+            <a:r>
+              <a:rPr lang="en-US" sz="2400" dirty="0">
+                <a:ln w="12700">
+                  <a:noFill/>
+                </a:ln>
+                <a:solidFill>
+                  <a:schemeClr val="bg1"/>
+                </a:solidFill>
+              </a:rPr>
+              <a:t> </a:t>
+            </a:r>
+            <a:r>
+              <a:rPr lang="en-US" sz="2400" dirty="0" err="1">
+                <a:ln w="12700">
+                  <a:noFill/>
+                </a:ln>
+                <a:solidFill>
+                  <a:schemeClr val="bg1"/>
+                </a:solidFill>
+              </a:rPr>
+              <a:t>Verändern</a:t>
+            </a:r>
+            <a:r>
+              <a:rPr lang="en-US" sz="2400" dirty="0">
+                <a:ln w="12700">
+                  <a:noFill/>
+                </a:ln>
+                <a:solidFill>
+                  <a:schemeClr val="bg1"/>
+                </a:solidFill>
+              </a:rPr>
+              <a:t> von </a:t>
+            </a:r>
+            <a:r>
+              <a:rPr lang="en-US" sz="2400" dirty="0" err="1">
+                <a:ln w="12700">
+                  <a:noFill/>
+                </a:ln>
+                <a:solidFill>
+                  <a:schemeClr val="bg1"/>
+                </a:solidFill>
+              </a:rPr>
+              <a:t>Prototypen</a:t>
+            </a:r>
+            <a:r>
+              <a:rPr lang="en-US" sz="2400" dirty="0">
+                <a:ln w="12700">
+                  <a:noFill/>
+                </a:ln>
+                <a:solidFill>
+                  <a:schemeClr val="bg1"/>
+                </a:solidFill>
+              </a:rPr>
+              <a:t> </a:t>
+            </a:r>
+            <a:r>
+              <a:rPr lang="en-US" sz="2400" dirty="0" err="1">
+                <a:ln w="12700">
+                  <a:noFill/>
+                </a:ln>
+                <a:solidFill>
+                  <a:schemeClr val="bg1"/>
+                </a:solidFill>
+              </a:rPr>
+              <a:t>hinzufügen</a:t>
+            </a:r>
+            <a:endParaRPr lang="de-DE" sz="2400" dirty="0">
+              <a:ln w="12700">
+                <a:noFill/>
+              </a:ln>
+              <a:solidFill>
+                <a:schemeClr val="bg1"/>
+              </a:solidFill>
+            </a:endParaRPr>
+          </a:p>
+        </p:txBody>
+      </p:sp>
+      <p:sp>
+        <p:nvSpPr>
+          <p:cNvPr id="26" name="Rechteck 25">
+            <a:extLst>
+              <a:ext uri="{FF2B5EF4-FFF2-40B4-BE49-F238E27FC236}">
+                <a16:creationId xmlns:a16="http://schemas.microsoft.com/office/drawing/2014/main" id="{A49D0160-08DA-453E-8C31-B650EFB6BEC2}"/>
+              </a:ext>
+            </a:extLst>
+          </p:cNvPr>
+          <p:cNvSpPr/>
+          <p:nvPr/>
+        </p:nvSpPr>
+        <p:spPr>
+          <a:xfrm>
+            <a:off x="6724100" y="2428445"/>
+            <a:ext cx="4645079" cy="1989566"/>
+          </a:xfrm>
+          <a:prstGeom prst="rect">
+            <a:avLst/>
+          </a:prstGeom>
+          <a:solidFill>
+            <a:srgbClr val="00B050">
+              <a:alpha val="75000"/>
+            </a:srgbClr>
+          </a:solidFill>
+          <a:ln w="31750">
+            <a:noFill/>
+          </a:ln>
+        </p:spPr>
+        <p:style>
+          <a:lnRef idx="2">
+            <a:schemeClr val="accent1">
+              <a:shade val="50000"/>
+            </a:schemeClr>
+          </a:lnRef>
+          <a:fillRef idx="1">
+            <a:schemeClr val="accent1"/>
+          </a:fillRef>
+          <a:effectRef idx="0">
+            <a:schemeClr val="accent1"/>
+          </a:effectRef>
+          <a:fontRef idx="minor">
+            <a:schemeClr val="lt1"/>
+          </a:fontRef>
+        </p:style>
+        <p:txBody>
+          <a:bodyPr rtlCol="0" anchor="ctr"/>
+          <a:lstStyle/>
+          <a:p>
+            <a:pPr algn="ctr"/>
+            <a:endParaRPr lang="de-DE" dirty="0">
+              <a:solidFill>
+                <a:schemeClr val="tx1"/>
+              </a:solidFill>
+            </a:endParaRPr>
+          </a:p>
+        </p:txBody>
+      </p:sp>
+      <p:sp>
+        <p:nvSpPr>
+          <p:cNvPr id="27" name="Rechteck 26">
+            <a:extLst>
+              <a:ext uri="{FF2B5EF4-FFF2-40B4-BE49-F238E27FC236}">
+                <a16:creationId xmlns:a16="http://schemas.microsoft.com/office/drawing/2014/main" id="{3FD0F8F6-AD78-4EDB-B2BB-1F9F31A92828}"/>
+              </a:ext>
+            </a:extLst>
+          </p:cNvPr>
+          <p:cNvSpPr/>
+          <p:nvPr/>
+        </p:nvSpPr>
+        <p:spPr>
+          <a:xfrm>
+            <a:off x="6657701" y="1571908"/>
+            <a:ext cx="4872448" cy="530868"/>
+          </a:xfrm>
+          <a:prstGeom prst="rect">
+            <a:avLst/>
+          </a:prstGeom>
+          <a:solidFill>
+            <a:srgbClr val="00B050">
+              <a:alpha val="75000"/>
+            </a:srgbClr>
+          </a:solidFill>
+          <a:ln w="31750">
+            <a:noFill/>
+          </a:ln>
+        </p:spPr>
+        <p:style>
+          <a:lnRef idx="2">
+            <a:schemeClr val="accent1">
+              <a:shade val="50000"/>
+            </a:schemeClr>
+          </a:lnRef>
+          <a:fillRef idx="1">
+            <a:schemeClr val="accent1"/>
+          </a:fillRef>
+          <a:effectRef idx="0">
+            <a:schemeClr val="accent1"/>
+          </a:effectRef>
+          <a:fontRef idx="minor">
+            <a:schemeClr val="lt1"/>
+          </a:fontRef>
+        </p:style>
+        <p:txBody>
+          <a:bodyPr rtlCol="0" anchor="ctr"/>
+          <a:lstStyle/>
+          <a:p>
+            <a:pPr algn="ctr"/>
+            <a:endParaRPr lang="de-DE" dirty="0">
+              <a:solidFill>
+                <a:schemeClr val="tx1"/>
+              </a:solidFill>
+            </a:endParaRPr>
+          </a:p>
+        </p:txBody>
+      </p:sp>
+      <p:grpSp>
+        <p:nvGrpSpPr>
+          <p:cNvPr id="28" name="Gruppieren 27">
+            <a:extLst>
+              <a:ext uri="{FF2B5EF4-FFF2-40B4-BE49-F238E27FC236}">
+                <a16:creationId xmlns:a16="http://schemas.microsoft.com/office/drawing/2014/main" id="{FB19D052-2DCC-4F54-BC86-44008AE8CFB7}"/>
+              </a:ext>
+            </a:extLst>
+          </p:cNvPr>
+          <p:cNvGrpSpPr/>
+          <p:nvPr/>
+        </p:nvGrpSpPr>
+        <p:grpSpPr>
+          <a:xfrm>
+            <a:off x="1" y="6116680"/>
+            <a:ext cx="12176753" cy="741320"/>
+            <a:chOff x="1" y="6116680"/>
+            <a:chExt cx="12176753" cy="741320"/>
+          </a:xfrm>
+        </p:grpSpPr>
+        <p:sp>
+          <p:nvSpPr>
+            <p:cNvPr id="29" name="Rechteck 28">
+              <a:extLst>
+                <a:ext uri="{FF2B5EF4-FFF2-40B4-BE49-F238E27FC236}">
+                  <a16:creationId xmlns:a16="http://schemas.microsoft.com/office/drawing/2014/main" id="{06CD56FA-B21C-48EA-98C9-539AA640475A}"/>
+                </a:ext>
+              </a:extLst>
+            </p:cNvPr>
+            <p:cNvSpPr/>
+            <p:nvPr/>
+          </p:nvSpPr>
+          <p:spPr>
+            <a:xfrm>
+              <a:off x="1" y="6122126"/>
+              <a:ext cx="1976846" cy="735874"/>
+            </a:xfrm>
+            <a:prstGeom prst="rect">
+              <a:avLst/>
+            </a:prstGeom>
+            <a:solidFill>
+              <a:schemeClr val="bg1">
+                <a:lumMod val="85000"/>
+              </a:schemeClr>
+            </a:solidFill>
+            <a:ln w="31750">
+              <a:solidFill>
+                <a:schemeClr val="bg1">
+                  <a:lumMod val="50000"/>
+                </a:schemeClr>
+              </a:solidFill>
+            </a:ln>
+          </p:spPr>
+          <p:style>
+            <a:lnRef idx="2">
+              <a:schemeClr val="accent1">
+                <a:shade val="50000"/>
+              </a:schemeClr>
+            </a:lnRef>
+            <a:fillRef idx="1">
+              <a:schemeClr val="accent1"/>
+            </a:fillRef>
+            <a:effectRef idx="0">
+              <a:schemeClr val="accent1"/>
+            </a:effectRef>
+            <a:fontRef idx="minor">
+              <a:schemeClr val="lt1"/>
+            </a:fontRef>
+          </p:style>
+          <p:txBody>
+            <a:bodyPr rtlCol="0" anchor="ctr"/>
+            <a:lstStyle/>
+            <a:p>
+              <a:pPr algn="ctr"/>
+              <a:r>
+                <a:rPr lang="en-US" sz="2000" dirty="0" err="1">
+                  <a:solidFill>
+                    <a:schemeClr val="tx1"/>
+                  </a:solidFill>
+                </a:rPr>
+                <a:t>Hauptfenster</a:t>
+              </a:r>
+              <a:endParaRPr lang="de-DE" dirty="0">
+                <a:solidFill>
+                  <a:schemeClr val="tx1"/>
+                </a:solidFill>
+              </a:endParaRPr>
+            </a:p>
+          </p:txBody>
+        </p:sp>
+        <p:sp>
+          <p:nvSpPr>
+            <p:cNvPr id="30" name="Rechteck 29">
+              <a:extLst>
+                <a:ext uri="{FF2B5EF4-FFF2-40B4-BE49-F238E27FC236}">
+                  <a16:creationId xmlns:a16="http://schemas.microsoft.com/office/drawing/2014/main" id="{DA0C27AC-FD4F-435D-82E6-7F219AF9ED1E}"/>
+                </a:ext>
+              </a:extLst>
+            </p:cNvPr>
+            <p:cNvSpPr/>
+            <p:nvPr/>
+          </p:nvSpPr>
+          <p:spPr>
+            <a:xfrm>
+              <a:off x="7713207" y="6116680"/>
+              <a:ext cx="4463547" cy="735874"/>
+            </a:xfrm>
+            <a:prstGeom prst="rect">
+              <a:avLst/>
+            </a:prstGeom>
+            <a:solidFill>
+              <a:schemeClr val="bg1">
+                <a:lumMod val="85000"/>
+              </a:schemeClr>
+            </a:solidFill>
+            <a:ln w="31750">
+              <a:solidFill>
+                <a:schemeClr val="bg1">
+                  <a:lumMod val="50000"/>
+                </a:schemeClr>
+              </a:solidFill>
+            </a:ln>
+          </p:spPr>
+          <p:style>
+            <a:lnRef idx="2">
+              <a:schemeClr val="accent1">
+                <a:shade val="50000"/>
+              </a:schemeClr>
+            </a:lnRef>
+            <a:fillRef idx="1">
+              <a:schemeClr val="accent1"/>
+            </a:fillRef>
+            <a:effectRef idx="0">
+              <a:schemeClr val="accent1"/>
+            </a:effectRef>
+            <a:fontRef idx="minor">
+              <a:schemeClr val="lt1"/>
+            </a:fontRef>
+          </p:style>
+          <p:txBody>
+            <a:bodyPr rtlCol="0" anchor="ctr"/>
+            <a:lstStyle/>
+            <a:p>
+              <a:pPr algn="ctr"/>
+              <a:r>
+                <a:rPr lang="en-US" sz="2000" dirty="0" err="1">
+                  <a:solidFill>
+                    <a:schemeClr val="tx1"/>
+                  </a:solidFill>
+                </a:rPr>
+                <a:t>Konfigurationsfeld</a:t>
+              </a:r>
+              <a:endParaRPr lang="de-DE" dirty="0">
+                <a:solidFill>
+                  <a:schemeClr val="tx1"/>
+                </a:solidFill>
+              </a:endParaRPr>
+            </a:p>
+          </p:txBody>
+        </p:sp>
+        <p:sp>
+          <p:nvSpPr>
+            <p:cNvPr id="31" name="Rechteck 30">
+              <a:extLst>
+                <a:ext uri="{FF2B5EF4-FFF2-40B4-BE49-F238E27FC236}">
+                  <a16:creationId xmlns:a16="http://schemas.microsoft.com/office/drawing/2014/main" id="{B5B1B7A8-FF69-4CDB-A202-6B833CE5E67C}"/>
+                </a:ext>
+              </a:extLst>
+            </p:cNvPr>
+            <p:cNvSpPr/>
+            <p:nvPr/>
+          </p:nvSpPr>
+          <p:spPr>
+            <a:xfrm>
+              <a:off x="4864142" y="6122126"/>
+              <a:ext cx="2887295" cy="735874"/>
+            </a:xfrm>
+            <a:prstGeom prst="rect">
+              <a:avLst/>
+            </a:prstGeom>
+            <a:solidFill>
+              <a:schemeClr val="bg1">
+                <a:lumMod val="85000"/>
+              </a:schemeClr>
+            </a:solidFill>
+            <a:ln w="31750">
+              <a:solidFill>
+                <a:schemeClr val="bg1">
+                  <a:lumMod val="50000"/>
+                </a:schemeClr>
+              </a:solidFill>
+            </a:ln>
+          </p:spPr>
+          <p:style>
+            <a:lnRef idx="2">
+              <a:schemeClr val="accent1">
+                <a:shade val="50000"/>
+              </a:schemeClr>
+            </a:lnRef>
+            <a:fillRef idx="1">
+              <a:schemeClr val="accent1"/>
+            </a:fillRef>
+            <a:effectRef idx="0">
+              <a:schemeClr val="accent1"/>
+            </a:effectRef>
+            <a:fontRef idx="minor">
+              <a:schemeClr val="lt1"/>
+            </a:fontRef>
+          </p:style>
+          <p:txBody>
+            <a:bodyPr rtlCol="0" anchor="ctr"/>
+            <a:lstStyle/>
+            <a:p>
+              <a:pPr algn="ctr"/>
+              <a:r>
+                <a:rPr lang="en-US" sz="2000" dirty="0" err="1">
+                  <a:solidFill>
+                    <a:schemeClr val="tx1"/>
+                  </a:solidFill>
+                </a:rPr>
+                <a:t>Prototypenfeld</a:t>
+              </a:r>
+              <a:endParaRPr lang="de-DE" dirty="0">
+                <a:solidFill>
+                  <a:schemeClr val="tx1"/>
+                </a:solidFill>
+              </a:endParaRPr>
+            </a:p>
+          </p:txBody>
+        </p:sp>
+        <p:sp>
+          <p:nvSpPr>
+            <p:cNvPr id="32" name="Rechteck 31">
+              <a:extLst>
+                <a:ext uri="{FF2B5EF4-FFF2-40B4-BE49-F238E27FC236}">
+                  <a16:creationId xmlns:a16="http://schemas.microsoft.com/office/drawing/2014/main" id="{DBC419F1-088A-4C9F-A80B-A219FBE61FC6}"/>
+                </a:ext>
+              </a:extLst>
+            </p:cNvPr>
+            <p:cNvSpPr/>
+            <p:nvPr/>
+          </p:nvSpPr>
+          <p:spPr>
+            <a:xfrm>
+              <a:off x="1976847" y="6119949"/>
+              <a:ext cx="2887295" cy="735874"/>
+            </a:xfrm>
+            <a:prstGeom prst="rect">
+              <a:avLst/>
+            </a:prstGeom>
+            <a:solidFill>
+              <a:schemeClr val="bg1">
+                <a:lumMod val="85000"/>
+              </a:schemeClr>
+            </a:solidFill>
+            <a:ln w="31750">
+              <a:solidFill>
+                <a:schemeClr val="bg1">
+                  <a:lumMod val="50000"/>
+                </a:schemeClr>
+              </a:solidFill>
+            </a:ln>
+          </p:spPr>
+          <p:style>
+            <a:lnRef idx="2">
+              <a:schemeClr val="accent1">
+                <a:shade val="50000"/>
+              </a:schemeClr>
+            </a:lnRef>
+            <a:fillRef idx="1">
+              <a:schemeClr val="accent1"/>
+            </a:fillRef>
+            <a:effectRef idx="0">
+              <a:schemeClr val="accent1"/>
+            </a:effectRef>
+            <a:fontRef idx="minor">
+              <a:schemeClr val="lt1"/>
+            </a:fontRef>
+          </p:style>
+          <p:txBody>
+            <a:bodyPr rtlCol="0" anchor="ctr"/>
+            <a:lstStyle/>
+            <a:p>
+              <a:pPr algn="ctr"/>
+              <a:r>
+                <a:rPr lang="en-US" sz="2000" dirty="0" err="1">
+                  <a:solidFill>
+                    <a:schemeClr val="tx1"/>
+                  </a:solidFill>
+                </a:rPr>
+                <a:t>Menü</a:t>
+              </a:r>
+              <a:endParaRPr lang="de-DE" dirty="0">
+                <a:solidFill>
+                  <a:schemeClr val="tx1"/>
+                </a:solidFill>
+              </a:endParaRPr>
+            </a:p>
+          </p:txBody>
+        </p:sp>
+      </p:grpSp>
+      <p:sp>
+        <p:nvSpPr>
+          <p:cNvPr id="33" name="Rechteck 32">
+            <a:extLst>
+              <a:ext uri="{FF2B5EF4-FFF2-40B4-BE49-F238E27FC236}">
+                <a16:creationId xmlns:a16="http://schemas.microsoft.com/office/drawing/2014/main" id="{645B1422-FECD-4BC5-A01D-9012357DCFF8}"/>
+              </a:ext>
+            </a:extLst>
+          </p:cNvPr>
+          <p:cNvSpPr/>
+          <p:nvPr/>
+        </p:nvSpPr>
+        <p:spPr>
+          <a:xfrm>
+            <a:off x="7751437" y="6150430"/>
+            <a:ext cx="4440563" cy="713015"/>
           </a:xfrm>
           <a:prstGeom prst="rect">
             <a:avLst/>
@@ -6434,10 +7885,68 @@
           </a:p>
         </p:txBody>
       </p:sp>
+      <p:sp>
+        <p:nvSpPr>
+          <p:cNvPr id="34" name="Rechteck 33">
+            <a:extLst>
+              <a:ext uri="{FF2B5EF4-FFF2-40B4-BE49-F238E27FC236}">
+                <a16:creationId xmlns:a16="http://schemas.microsoft.com/office/drawing/2014/main" id="{20198946-92FB-4C09-A7C7-ADE2C89E8808}"/>
+              </a:ext>
+            </a:extLst>
+          </p:cNvPr>
+          <p:cNvSpPr/>
+          <p:nvPr/>
+        </p:nvSpPr>
+        <p:spPr>
+          <a:xfrm>
+            <a:off x="-30474" y="6116681"/>
+            <a:ext cx="4885909" cy="741320"/>
+          </a:xfrm>
+          <a:prstGeom prst="rect">
+            <a:avLst/>
+          </a:prstGeom>
+          <a:solidFill>
+            <a:schemeClr val="bg1">
+              <a:alpha val="80000"/>
+            </a:schemeClr>
+          </a:solidFill>
+          <a:ln w="31750">
+            <a:noFill/>
+          </a:ln>
+        </p:spPr>
+        <p:style>
+          <a:lnRef idx="2">
+            <a:schemeClr val="accent1">
+              <a:shade val="50000"/>
+            </a:schemeClr>
+          </a:lnRef>
+          <a:fillRef idx="1">
+            <a:schemeClr val="accent1"/>
+          </a:fillRef>
+          <a:effectRef idx="0">
+            <a:schemeClr val="accent1"/>
+          </a:effectRef>
+          <a:fontRef idx="minor">
+            <a:schemeClr val="lt1"/>
+          </a:fontRef>
+        </p:style>
+        <p:txBody>
+          <a:bodyPr rtlCol="0" anchor="ctr"/>
+          <a:lstStyle/>
+          <a:p>
+            <a:pPr algn="ctr"/>
+            <a:endParaRPr lang="de-DE" dirty="0">
+              <a:solidFill>
+                <a:schemeClr val="tx1"/>
+              </a:solidFill>
+            </a:endParaRPr>
+          </a:p>
+        </p:txBody>
+      </p:sp>
     </p:spTree>
     <p:extLst>
       <p:ext uri="{BB962C8B-B14F-4D97-AF65-F5344CB8AC3E}">
-        <p14:creationId xmlns:p14="http://schemas.microsoft.com/office/powerpoint/2010/main" val="449765184"/>
+        <p14:creationId xmlns:p14="http://schemas.microsoft.com/office/powerpoint/2010/main" val="3134703634"/>
       </p:ext>
     </p:extLst>
   </p:cSld>
@@ -6518,298 +8027,6 @@
       </p:sp>
       <p:sp>
         <p:nvSpPr>
-          <p:cNvPr id="5" name="Rechteck 4">
-            <a:extLst>
-              <a:ext uri="{FF2B5EF4-FFF2-40B4-BE49-F238E27FC236}">
-                <a16:creationId xmlns:a16="http://schemas.microsoft.com/office/drawing/2014/main" id="{F8D33603-EE5F-46B7-8B5E-60A82565FB28}"/>
-              </a:ext>
-            </a:extLst>
-          </p:cNvPr>
-          <p:cNvSpPr/>
-          <p:nvPr/>
-        </p:nvSpPr>
-        <p:spPr>
-          <a:xfrm>
-            <a:off x="0" y="6122126"/>
-            <a:ext cx="4171406" cy="735874"/>
-          </a:xfrm>
-          <a:prstGeom prst="rect">
-            <a:avLst/>
-          </a:prstGeom>
-          <a:solidFill>
-            <a:schemeClr val="bg1">
-              <a:lumMod val="85000"/>
-            </a:schemeClr>
-          </a:solidFill>
-          <a:ln w="31750">
-            <a:solidFill>
-              <a:schemeClr val="bg1">
-                <a:lumMod val="50000"/>
-              </a:schemeClr>
-            </a:solidFill>
-          </a:ln>
-        </p:spPr>
-        <p:style>
-          <a:lnRef idx="2">
-            <a:schemeClr val="accent1">
-              <a:shade val="50000"/>
-            </a:schemeClr>
-          </a:lnRef>
-          <a:fillRef idx="1">
-            <a:schemeClr val="accent1"/>
-          </a:fillRef>
-          <a:effectRef idx="0">
-            <a:schemeClr val="accent1"/>
-          </a:effectRef>
-          <a:fontRef idx="minor">
-            <a:schemeClr val="lt1"/>
-          </a:fontRef>
-        </p:style>
-        <p:txBody>
-          <a:bodyPr rtlCol="0" anchor="ctr"/>
-          <a:lstStyle/>
-          <a:p>
-            <a:pPr algn="ctr"/>
-            <a:r>
-              <a:rPr lang="en-US" sz="2000" dirty="0" err="1">
-                <a:solidFill>
-                  <a:schemeClr val="tx1"/>
-                </a:solidFill>
-              </a:rPr>
-              <a:t>Hauptfenster</a:t>
-            </a:r>
-            <a:endParaRPr lang="de-DE" dirty="0">
-              <a:solidFill>
-                <a:schemeClr val="tx1"/>
-              </a:solidFill>
-            </a:endParaRPr>
-          </a:p>
-        </p:txBody>
-      </p:sp>
-      <p:sp>
-        <p:nvSpPr>
-          <p:cNvPr id="6" name="Rechteck 5">
-            <a:extLst>
-              <a:ext uri="{FF2B5EF4-FFF2-40B4-BE49-F238E27FC236}">
-                <a16:creationId xmlns:a16="http://schemas.microsoft.com/office/drawing/2014/main" id="{BB0B3755-5F21-48E5-988A-183FA40BE993}"/>
-              </a:ext>
-            </a:extLst>
-          </p:cNvPr>
-          <p:cNvSpPr/>
-          <p:nvPr/>
-        </p:nvSpPr>
-        <p:spPr>
-          <a:xfrm>
-            <a:off x="4171406" y="6122126"/>
-            <a:ext cx="4119154" cy="735874"/>
-          </a:xfrm>
-          <a:prstGeom prst="rect">
-            <a:avLst/>
-          </a:prstGeom>
-          <a:solidFill>
-            <a:schemeClr val="bg1">
-              <a:lumMod val="85000"/>
-            </a:schemeClr>
-          </a:solidFill>
-          <a:ln w="31750">
-            <a:solidFill>
-              <a:schemeClr val="bg1">
-                <a:lumMod val="50000"/>
-              </a:schemeClr>
-            </a:solidFill>
-          </a:ln>
-        </p:spPr>
-        <p:style>
-          <a:lnRef idx="2">
-            <a:schemeClr val="accent1">
-              <a:shade val="50000"/>
-            </a:schemeClr>
-          </a:lnRef>
-          <a:fillRef idx="1">
-            <a:schemeClr val="accent1"/>
-          </a:fillRef>
-          <a:effectRef idx="0">
-            <a:schemeClr val="accent1"/>
-          </a:effectRef>
-          <a:fontRef idx="minor">
-            <a:schemeClr val="lt1"/>
-          </a:fontRef>
-        </p:style>
-        <p:txBody>
-          <a:bodyPr rtlCol="0" anchor="ctr"/>
-          <a:lstStyle/>
-          <a:p>
-            <a:pPr algn="ctr"/>
-            <a:r>
-              <a:rPr lang="en-US" sz="2000" dirty="0" err="1">
-                <a:solidFill>
-                  <a:schemeClr val="tx1"/>
-                </a:solidFill>
-              </a:rPr>
-              <a:t>Konfigurationsfeld</a:t>
-            </a:r>
-            <a:endParaRPr lang="de-DE" dirty="0">
-              <a:solidFill>
-                <a:schemeClr val="tx1"/>
-              </a:solidFill>
-            </a:endParaRPr>
-          </a:p>
-        </p:txBody>
-      </p:sp>
-      <p:sp>
-        <p:nvSpPr>
-          <p:cNvPr id="7" name="Rechteck 6">
-            <a:extLst>
-              <a:ext uri="{FF2B5EF4-FFF2-40B4-BE49-F238E27FC236}">
-                <a16:creationId xmlns:a16="http://schemas.microsoft.com/office/drawing/2014/main" id="{62C82B8B-BE55-4729-B09E-417C0AE0DE93}"/>
-              </a:ext>
-            </a:extLst>
-          </p:cNvPr>
-          <p:cNvSpPr/>
-          <p:nvPr/>
-        </p:nvSpPr>
-        <p:spPr>
-          <a:xfrm>
-            <a:off x="8290560" y="6122126"/>
-            <a:ext cx="3901440" cy="735874"/>
-          </a:xfrm>
-          <a:prstGeom prst="rect">
-            <a:avLst/>
-          </a:prstGeom>
-          <a:solidFill>
-            <a:schemeClr val="bg1">
-              <a:lumMod val="85000"/>
-            </a:schemeClr>
-          </a:solidFill>
-          <a:ln w="31750">
-            <a:solidFill>
-              <a:schemeClr val="bg1">
-                <a:lumMod val="50000"/>
-              </a:schemeClr>
-            </a:solidFill>
-          </a:ln>
-        </p:spPr>
-        <p:style>
-          <a:lnRef idx="2">
-            <a:schemeClr val="accent1">
-              <a:shade val="50000"/>
-            </a:schemeClr>
-          </a:lnRef>
-          <a:fillRef idx="1">
-            <a:schemeClr val="accent1"/>
-          </a:fillRef>
-          <a:effectRef idx="0">
-            <a:schemeClr val="accent1"/>
-          </a:effectRef>
-          <a:fontRef idx="minor">
-            <a:schemeClr val="lt1"/>
-          </a:fontRef>
-        </p:style>
-        <p:txBody>
-          <a:bodyPr rtlCol="0" anchor="ctr"/>
-          <a:lstStyle/>
-          <a:p>
-            <a:pPr algn="ctr"/>
-            <a:r>
-              <a:rPr lang="en-US" sz="2000" dirty="0">
-                <a:solidFill>
-                  <a:schemeClr val="tx1"/>
-                </a:solidFill>
-              </a:rPr>
-              <a:t>Editor </a:t>
-            </a:r>
-            <a:r>
-              <a:rPr lang="en-US" sz="2000" dirty="0" err="1">
-                <a:solidFill>
-                  <a:schemeClr val="tx1"/>
-                </a:solidFill>
-              </a:rPr>
-              <a:t>für</a:t>
-            </a:r>
-            <a:r>
-              <a:rPr lang="en-US" sz="2000" dirty="0">
-                <a:solidFill>
-                  <a:schemeClr val="tx1"/>
-                </a:solidFill>
-              </a:rPr>
-              <a:t> </a:t>
-            </a:r>
-            <a:r>
-              <a:rPr lang="en-US" sz="2000" dirty="0" err="1">
-                <a:solidFill>
-                  <a:schemeClr val="tx1"/>
-                </a:solidFill>
-              </a:rPr>
-              <a:t>Konfigurationen</a:t>
-            </a:r>
-            <a:endParaRPr lang="de-DE" dirty="0">
-              <a:solidFill>
-                <a:schemeClr val="tx1"/>
-              </a:solidFill>
-            </a:endParaRPr>
-          </a:p>
-        </p:txBody>
-      </p:sp>
-      <p:sp>
-        <p:nvSpPr>
-          <p:cNvPr id="9" name="Rechteck 8">
-            <a:extLst>
-              <a:ext uri="{FF2B5EF4-FFF2-40B4-BE49-F238E27FC236}">
-                <a16:creationId xmlns:a16="http://schemas.microsoft.com/office/drawing/2014/main" id="{81AF1F01-DE57-4926-B2A4-A4CCC4CDB337}"/>
-              </a:ext>
-            </a:extLst>
-          </p:cNvPr>
-          <p:cNvSpPr/>
-          <p:nvPr/>
-        </p:nvSpPr>
-        <p:spPr>
-          <a:xfrm>
-            <a:off x="-174173" y="5982796"/>
-            <a:ext cx="8442965" cy="1193067"/>
-          </a:xfrm>
-          <a:prstGeom prst="rect">
-            <a:avLst/>
-          </a:prstGeom>
-          <a:solidFill>
-            <a:schemeClr val="bg1">
-              <a:alpha val="80000"/>
-            </a:schemeClr>
-          </a:solidFill>
-          <a:ln w="31750">
-            <a:noFill/>
-          </a:ln>
-        </p:spPr>
-        <p:style>
-          <a:lnRef idx="2">
-            <a:schemeClr val="accent1">
-              <a:shade val="50000"/>
-            </a:schemeClr>
-          </a:lnRef>
-          <a:fillRef idx="1">
-            <a:schemeClr val="accent1"/>
-          </a:fillRef>
-          <a:effectRef idx="0">
-            <a:schemeClr val="accent1"/>
-          </a:effectRef>
-          <a:fontRef idx="minor">
-            <a:schemeClr val="lt1"/>
-          </a:fontRef>
-        </p:style>
-        <p:txBody>
-          <a:bodyPr rtlCol="0" anchor="ctr"/>
-          <a:lstStyle/>
-          <a:p>
-            <a:pPr algn="ctr"/>
-            <a:endParaRPr lang="de-DE" dirty="0">
-              <a:solidFill>
-                <a:schemeClr val="tx1"/>
-              </a:solidFill>
-            </a:endParaRPr>
-          </a:p>
-        </p:txBody>
-      </p:sp>
-      <p:sp>
-        <p:nvSpPr>
           <p:cNvPr id="10" name="Rechteck 9">
             <a:extLst>
               <a:ext uri="{FF2B5EF4-FFF2-40B4-BE49-F238E27FC236}">
@@ -6859,84 +8076,6 @@
             <a:endParaRPr lang="de-DE" dirty="0">
               <a:solidFill>
                 <a:schemeClr val="tx1"/>
-              </a:solidFill>
-            </a:endParaRPr>
-          </a:p>
-        </p:txBody>
-      </p:sp>
-      <p:sp>
-        <p:nvSpPr>
-          <p:cNvPr id="11" name="Rechteck 10">
-            <a:extLst>
-              <a:ext uri="{FF2B5EF4-FFF2-40B4-BE49-F238E27FC236}">
-                <a16:creationId xmlns:a16="http://schemas.microsoft.com/office/drawing/2014/main" id="{125161CD-7200-4107-A0C1-710F35774DC9}"/>
-              </a:ext>
-            </a:extLst>
-          </p:cNvPr>
-          <p:cNvSpPr/>
-          <p:nvPr/>
-        </p:nvSpPr>
-        <p:spPr>
-          <a:xfrm>
-            <a:off x="8707" y="0"/>
-            <a:ext cx="1114699" cy="1027611"/>
-          </a:xfrm>
-          <a:prstGeom prst="rect">
-            <a:avLst/>
-          </a:prstGeom>
-          <a:solidFill>
-            <a:schemeClr val="tx1"/>
-          </a:solidFill>
-          <a:ln w="31750">
-            <a:solidFill>
-              <a:schemeClr val="tx1"/>
-            </a:solidFill>
-            <a:round/>
-          </a:ln>
-        </p:spPr>
-        <p:style>
-          <a:lnRef idx="2">
-            <a:schemeClr val="accent1">
-              <a:shade val="50000"/>
-            </a:schemeClr>
-          </a:lnRef>
-          <a:fillRef idx="1">
-            <a:schemeClr val="accent1"/>
-          </a:fillRef>
-          <a:effectRef idx="0">
-            <a:schemeClr val="accent1"/>
-          </a:effectRef>
-          <a:fontRef idx="minor">
-            <a:schemeClr val="lt1"/>
-          </a:fontRef>
-        </p:style>
-        <p:txBody>
-          <a:bodyPr rtlCol="0" anchor="ctr"/>
-          <a:lstStyle/>
-          <a:p>
-            <a:pPr algn="ctr"/>
-            <a:r>
-              <a:rPr lang="en-US" sz="3200" dirty="0">
-                <a:solidFill>
-                  <a:schemeClr val="bg1"/>
-                </a:solidFill>
-              </a:rPr>
-              <a:t>IST</a:t>
-            </a:r>
-          </a:p>
-          <a:p>
-            <a:pPr algn="ctr"/>
-            <a:r>
-              <a:rPr lang="en-US" dirty="0" err="1">
-                <a:solidFill>
-                  <a:schemeClr val="bg1"/>
-                </a:solidFill>
-              </a:rPr>
-              <a:t>Zustand</a:t>
-            </a:r>
-            <a:endParaRPr lang="de-DE" dirty="0">
-              <a:solidFill>
-                <a:schemeClr val="bg1"/>
               </a:solidFill>
             </a:endParaRPr>
           </a:p>
@@ -7486,10 +8625,908 @@
           </a:p>
         </p:txBody>
       </p:sp>
+      <p:pic>
+        <p:nvPicPr>
+          <p:cNvPr id="23" name="Grafik 22" descr="Ein Bild, das Screenshot, Person enthält.&#10;&#10;Automatisch generierte Beschreibung">
+            <a:extLst>
+              <a:ext uri="{FF2B5EF4-FFF2-40B4-BE49-F238E27FC236}">
+                <a16:creationId xmlns:a16="http://schemas.microsoft.com/office/drawing/2014/main" id="{A77C6971-5A46-49EF-8C3F-3811569D94F5}"/>
+              </a:ext>
+            </a:extLst>
+          </p:cNvPr>
+          <p:cNvPicPr>
+            <a:picLocks noChangeAspect="1"/>
+          </p:cNvPicPr>
+          <p:nvPr/>
+        </p:nvPicPr>
+        <p:blipFill rotWithShape="1">
+          <a:blip r:embed="rId2">
+            <a:extLst>
+              <a:ext uri="{28A0092B-C50C-407E-A947-70E740481C1C}">
+                <a14:useLocalDpi xmlns:a14="http://schemas.microsoft.com/office/drawing/2010/main" val="0"/>
+              </a:ext>
+            </a:extLst>
+          </a:blip>
+          <a:srcRect t="52656"/>
+          <a:stretch/>
+        </p:blipFill>
+        <p:spPr>
+          <a:xfrm>
+            <a:off x="1768594" y="154445"/>
+            <a:ext cx="3421712" cy="875470"/>
+          </a:xfrm>
+          <a:prstGeom prst="rect">
+            <a:avLst/>
+          </a:prstGeom>
+        </p:spPr>
+      </p:pic>
+      <p:pic>
+        <p:nvPicPr>
+          <p:cNvPr id="25" name="Grafik 24">
+            <a:extLst>
+              <a:ext uri="{FF2B5EF4-FFF2-40B4-BE49-F238E27FC236}">
+                <a16:creationId xmlns:a16="http://schemas.microsoft.com/office/drawing/2014/main" id="{BDF802CE-5597-4B4F-A148-D9CCFB86CE7A}"/>
+              </a:ext>
+            </a:extLst>
+          </p:cNvPr>
+          <p:cNvPicPr>
+            <a:picLocks noChangeAspect="1"/>
+          </p:cNvPicPr>
+          <p:nvPr/>
+        </p:nvPicPr>
+        <p:blipFill>
+          <a:blip r:embed="rId3">
+            <a:extLst>
+              <a:ext uri="{28A0092B-C50C-407E-A947-70E740481C1C}">
+                <a14:useLocalDpi xmlns:a14="http://schemas.microsoft.com/office/drawing/2010/main" val="0"/>
+              </a:ext>
+            </a:extLst>
+          </a:blip>
+          <a:stretch>
+            <a:fillRect/>
+          </a:stretch>
+        </p:blipFill>
+        <p:spPr>
+          <a:xfrm>
+            <a:off x="6757596" y="1898010"/>
+            <a:ext cx="4480000" cy="2520000"/>
+          </a:xfrm>
+          <a:prstGeom prst="rect">
+            <a:avLst/>
+          </a:prstGeom>
+        </p:spPr>
+      </p:pic>
+      <p:sp>
+        <p:nvSpPr>
+          <p:cNvPr id="21" name="Rechteck 20">
+            <a:extLst>
+              <a:ext uri="{FF2B5EF4-FFF2-40B4-BE49-F238E27FC236}">
+                <a16:creationId xmlns:a16="http://schemas.microsoft.com/office/drawing/2014/main" id="{18222290-78B7-4FA9-A3B4-DDC2AC8CBCBF}"/>
+              </a:ext>
+            </a:extLst>
+          </p:cNvPr>
+          <p:cNvSpPr/>
+          <p:nvPr/>
+        </p:nvSpPr>
+        <p:spPr>
+          <a:xfrm>
+            <a:off x="8707" y="0"/>
+            <a:ext cx="1114699" cy="1027611"/>
+          </a:xfrm>
+          <a:prstGeom prst="rect">
+            <a:avLst/>
+          </a:prstGeom>
+          <a:solidFill>
+            <a:schemeClr val="tx1"/>
+          </a:solidFill>
+          <a:ln w="31750">
+            <a:solidFill>
+              <a:schemeClr val="tx1"/>
+            </a:solidFill>
+            <a:round/>
+          </a:ln>
+        </p:spPr>
+        <p:style>
+          <a:lnRef idx="2">
+            <a:schemeClr val="accent1">
+              <a:shade val="50000"/>
+            </a:schemeClr>
+          </a:lnRef>
+          <a:fillRef idx="1">
+            <a:schemeClr val="accent1"/>
+          </a:fillRef>
+          <a:effectRef idx="0">
+            <a:schemeClr val="accent1"/>
+          </a:effectRef>
+          <a:fontRef idx="minor">
+            <a:schemeClr val="lt1"/>
+          </a:fontRef>
+        </p:style>
+        <p:txBody>
+          <a:bodyPr rtlCol="0" anchor="ctr"/>
+          <a:lstStyle/>
+          <a:p>
+            <a:pPr algn="ctr"/>
+            <a:r>
+              <a:rPr lang="en-US" sz="3200" dirty="0" err="1">
+                <a:solidFill>
+                  <a:schemeClr val="bg1"/>
+                </a:solidFill>
+              </a:rPr>
+              <a:t>ToDo</a:t>
+            </a:r>
+            <a:endParaRPr lang="en-US" sz="3200" dirty="0">
+              <a:solidFill>
+                <a:schemeClr val="bg1"/>
+              </a:solidFill>
+            </a:endParaRPr>
+          </a:p>
+        </p:txBody>
+      </p:sp>
+      <p:sp>
+        <p:nvSpPr>
+          <p:cNvPr id="22" name="Rechteck 21">
+            <a:extLst>
+              <a:ext uri="{FF2B5EF4-FFF2-40B4-BE49-F238E27FC236}">
+                <a16:creationId xmlns:a16="http://schemas.microsoft.com/office/drawing/2014/main" id="{A8AC8E9B-13E7-4D4E-BC13-0B1E21B63CC4}"/>
+              </a:ext>
+            </a:extLst>
+          </p:cNvPr>
+          <p:cNvSpPr/>
+          <p:nvPr/>
+        </p:nvSpPr>
+        <p:spPr>
+          <a:xfrm>
+            <a:off x="652598" y="1669808"/>
+            <a:ext cx="4470758" cy="936170"/>
+          </a:xfrm>
+          <a:prstGeom prst="rect">
+            <a:avLst/>
+          </a:prstGeom>
+          <a:solidFill>
+            <a:srgbClr val="FF0000">
+              <a:alpha val="85000"/>
+            </a:srgbClr>
+          </a:solidFill>
+          <a:ln w="57150">
+            <a:solidFill>
+              <a:srgbClr val="C00000"/>
+            </a:solidFill>
+          </a:ln>
+        </p:spPr>
+        <p:style>
+          <a:lnRef idx="2">
+            <a:schemeClr val="accent1">
+              <a:shade val="50000"/>
+            </a:schemeClr>
+          </a:lnRef>
+          <a:fillRef idx="1">
+            <a:schemeClr val="accent1"/>
+          </a:fillRef>
+          <a:effectRef idx="0">
+            <a:schemeClr val="accent1"/>
+          </a:effectRef>
+          <a:fontRef idx="minor">
+            <a:schemeClr val="lt1"/>
+          </a:fontRef>
+        </p:style>
+        <p:txBody>
+          <a:bodyPr rtlCol="0" anchor="ctr"/>
+          <a:lstStyle/>
+          <a:p>
+            <a:pPr algn="ctr"/>
+            <a:r>
+              <a:rPr lang="en-US" sz="2400" dirty="0">
+                <a:ln w="12700">
+                  <a:noFill/>
+                </a:ln>
+                <a:solidFill>
+                  <a:schemeClr val="bg1"/>
+                </a:solidFill>
+              </a:rPr>
+              <a:t>Editor in das </a:t>
+            </a:r>
+            <a:r>
+              <a:rPr lang="en-US" sz="2400" dirty="0" err="1">
+                <a:ln w="12700">
+                  <a:noFill/>
+                </a:ln>
+                <a:solidFill>
+                  <a:schemeClr val="bg1"/>
+                </a:solidFill>
+              </a:rPr>
+              <a:t>Hauptfenster</a:t>
+            </a:r>
+            <a:r>
+              <a:rPr lang="en-US" sz="2400" dirty="0">
+                <a:ln w="12700">
+                  <a:noFill/>
+                </a:ln>
+                <a:solidFill>
+                  <a:schemeClr val="bg1"/>
+                </a:solidFill>
+              </a:rPr>
+              <a:t> </a:t>
+            </a:r>
+            <a:r>
+              <a:rPr lang="en-US" sz="2400" dirty="0" err="1">
+                <a:ln w="12700">
+                  <a:noFill/>
+                </a:ln>
+                <a:solidFill>
+                  <a:schemeClr val="bg1"/>
+                </a:solidFill>
+              </a:rPr>
+              <a:t>einfügen</a:t>
+            </a:r>
+            <a:endParaRPr lang="de-DE" sz="2400" dirty="0">
+              <a:ln w="12700">
+                <a:noFill/>
+              </a:ln>
+              <a:solidFill>
+                <a:schemeClr val="bg1"/>
+              </a:solidFill>
+            </a:endParaRPr>
+          </a:p>
+        </p:txBody>
+      </p:sp>
+      <p:sp>
+        <p:nvSpPr>
+          <p:cNvPr id="24" name="Rechteck 23">
+            <a:extLst>
+              <a:ext uri="{FF2B5EF4-FFF2-40B4-BE49-F238E27FC236}">
+                <a16:creationId xmlns:a16="http://schemas.microsoft.com/office/drawing/2014/main" id="{D84AE68B-67A1-4588-A4BC-01B7B5C9BBEB}"/>
+              </a:ext>
+            </a:extLst>
+          </p:cNvPr>
+          <p:cNvSpPr/>
+          <p:nvPr/>
+        </p:nvSpPr>
+        <p:spPr>
+          <a:xfrm>
+            <a:off x="6483525" y="1638808"/>
+            <a:ext cx="4872448" cy="777819"/>
+          </a:xfrm>
+          <a:prstGeom prst="rect">
+            <a:avLst/>
+          </a:prstGeom>
+          <a:solidFill>
+            <a:srgbClr val="00B050">
+              <a:alpha val="75000"/>
+            </a:srgbClr>
+          </a:solidFill>
+          <a:ln w="31750">
+            <a:noFill/>
+          </a:ln>
+        </p:spPr>
+        <p:style>
+          <a:lnRef idx="2">
+            <a:schemeClr val="accent1">
+              <a:shade val="50000"/>
+            </a:schemeClr>
+          </a:lnRef>
+          <a:fillRef idx="1">
+            <a:schemeClr val="accent1"/>
+          </a:fillRef>
+          <a:effectRef idx="0">
+            <a:schemeClr val="accent1"/>
+          </a:effectRef>
+          <a:fontRef idx="minor">
+            <a:schemeClr val="lt1"/>
+          </a:fontRef>
+        </p:style>
+        <p:txBody>
+          <a:bodyPr rtlCol="0" anchor="ctr"/>
+          <a:lstStyle/>
+          <a:p>
+            <a:pPr algn="ctr"/>
+            <a:endParaRPr lang="de-DE" dirty="0">
+              <a:solidFill>
+                <a:schemeClr val="tx1"/>
+              </a:solidFill>
+            </a:endParaRPr>
+          </a:p>
+        </p:txBody>
+      </p:sp>
+      <p:grpSp>
+        <p:nvGrpSpPr>
+          <p:cNvPr id="26" name="Gruppieren 25">
+            <a:extLst>
+              <a:ext uri="{FF2B5EF4-FFF2-40B4-BE49-F238E27FC236}">
+                <a16:creationId xmlns:a16="http://schemas.microsoft.com/office/drawing/2014/main" id="{5368D599-0AD0-4AAB-8548-A484BFE9B2FD}"/>
+              </a:ext>
+            </a:extLst>
+          </p:cNvPr>
+          <p:cNvGrpSpPr/>
+          <p:nvPr/>
+        </p:nvGrpSpPr>
+        <p:grpSpPr>
+          <a:xfrm>
+            <a:off x="1" y="6116680"/>
+            <a:ext cx="12176753" cy="741320"/>
+            <a:chOff x="1" y="6116680"/>
+            <a:chExt cx="12176753" cy="741320"/>
+          </a:xfrm>
+        </p:grpSpPr>
+        <p:sp>
+          <p:nvSpPr>
+            <p:cNvPr id="27" name="Rechteck 26">
+              <a:extLst>
+                <a:ext uri="{FF2B5EF4-FFF2-40B4-BE49-F238E27FC236}">
+                  <a16:creationId xmlns:a16="http://schemas.microsoft.com/office/drawing/2014/main" id="{94404F05-0AB7-4B64-8C4B-DE1A2554294B}"/>
+                </a:ext>
+              </a:extLst>
+            </p:cNvPr>
+            <p:cNvSpPr/>
+            <p:nvPr/>
+          </p:nvSpPr>
+          <p:spPr>
+            <a:xfrm>
+              <a:off x="1" y="6122126"/>
+              <a:ext cx="1976846" cy="735874"/>
+            </a:xfrm>
+            <a:prstGeom prst="rect">
+              <a:avLst/>
+            </a:prstGeom>
+            <a:solidFill>
+              <a:schemeClr val="bg1">
+                <a:lumMod val="85000"/>
+              </a:schemeClr>
+            </a:solidFill>
+            <a:ln w="31750">
+              <a:solidFill>
+                <a:schemeClr val="bg1">
+                  <a:lumMod val="50000"/>
+                </a:schemeClr>
+              </a:solidFill>
+            </a:ln>
+          </p:spPr>
+          <p:style>
+            <a:lnRef idx="2">
+              <a:schemeClr val="accent1">
+                <a:shade val="50000"/>
+              </a:schemeClr>
+            </a:lnRef>
+            <a:fillRef idx="1">
+              <a:schemeClr val="accent1"/>
+            </a:fillRef>
+            <a:effectRef idx="0">
+              <a:schemeClr val="accent1"/>
+            </a:effectRef>
+            <a:fontRef idx="minor">
+              <a:schemeClr val="lt1"/>
+            </a:fontRef>
+          </p:style>
+          <p:txBody>
+            <a:bodyPr rtlCol="0" anchor="ctr"/>
+            <a:lstStyle/>
+            <a:p>
+              <a:pPr algn="ctr"/>
+              <a:r>
+                <a:rPr lang="en-US" sz="2000" dirty="0" err="1">
+                  <a:solidFill>
+                    <a:schemeClr val="tx1"/>
+                  </a:solidFill>
+                </a:rPr>
+                <a:t>Hauptfenster</a:t>
+              </a:r>
+              <a:endParaRPr lang="de-DE" dirty="0">
+                <a:solidFill>
+                  <a:schemeClr val="tx1"/>
+                </a:solidFill>
+              </a:endParaRPr>
+            </a:p>
+          </p:txBody>
+        </p:sp>
+        <p:sp>
+          <p:nvSpPr>
+            <p:cNvPr id="28" name="Rechteck 27">
+              <a:extLst>
+                <a:ext uri="{FF2B5EF4-FFF2-40B4-BE49-F238E27FC236}">
+                  <a16:creationId xmlns:a16="http://schemas.microsoft.com/office/drawing/2014/main" id="{CC300558-275B-4A6C-AD5E-2A1CE9D00699}"/>
+                </a:ext>
+              </a:extLst>
+            </p:cNvPr>
+            <p:cNvSpPr/>
+            <p:nvPr/>
+          </p:nvSpPr>
+          <p:spPr>
+            <a:xfrm>
+              <a:off x="7713207" y="6116680"/>
+              <a:ext cx="4463547" cy="735874"/>
+            </a:xfrm>
+            <a:prstGeom prst="rect">
+              <a:avLst/>
+            </a:prstGeom>
+            <a:solidFill>
+              <a:schemeClr val="bg1">
+                <a:lumMod val="85000"/>
+              </a:schemeClr>
+            </a:solidFill>
+            <a:ln w="31750">
+              <a:solidFill>
+                <a:schemeClr val="bg1">
+                  <a:lumMod val="50000"/>
+                </a:schemeClr>
+              </a:solidFill>
+            </a:ln>
+          </p:spPr>
+          <p:style>
+            <a:lnRef idx="2">
+              <a:schemeClr val="accent1">
+                <a:shade val="50000"/>
+              </a:schemeClr>
+            </a:lnRef>
+            <a:fillRef idx="1">
+              <a:schemeClr val="accent1"/>
+            </a:fillRef>
+            <a:effectRef idx="0">
+              <a:schemeClr val="accent1"/>
+            </a:effectRef>
+            <a:fontRef idx="minor">
+              <a:schemeClr val="lt1"/>
+            </a:fontRef>
+          </p:style>
+          <p:txBody>
+            <a:bodyPr rtlCol="0" anchor="ctr"/>
+            <a:lstStyle/>
+            <a:p>
+              <a:pPr algn="ctr"/>
+              <a:r>
+                <a:rPr lang="en-US" sz="2000" dirty="0" err="1">
+                  <a:solidFill>
+                    <a:schemeClr val="tx1"/>
+                  </a:solidFill>
+                </a:rPr>
+                <a:t>Konfigurationsfeld</a:t>
+              </a:r>
+              <a:endParaRPr lang="de-DE" dirty="0">
+                <a:solidFill>
+                  <a:schemeClr val="tx1"/>
+                </a:solidFill>
+              </a:endParaRPr>
+            </a:p>
+          </p:txBody>
+        </p:sp>
+        <p:sp>
+          <p:nvSpPr>
+            <p:cNvPr id="29" name="Rechteck 28">
+              <a:extLst>
+                <a:ext uri="{FF2B5EF4-FFF2-40B4-BE49-F238E27FC236}">
+                  <a16:creationId xmlns:a16="http://schemas.microsoft.com/office/drawing/2014/main" id="{55DFCEF2-E710-4FE7-80FF-0C2DBA09948F}"/>
+                </a:ext>
+              </a:extLst>
+            </p:cNvPr>
+            <p:cNvSpPr/>
+            <p:nvPr/>
+          </p:nvSpPr>
+          <p:spPr>
+            <a:xfrm>
+              <a:off x="4864142" y="6122126"/>
+              <a:ext cx="2887295" cy="735874"/>
+            </a:xfrm>
+            <a:prstGeom prst="rect">
+              <a:avLst/>
+            </a:prstGeom>
+            <a:solidFill>
+              <a:schemeClr val="bg1">
+                <a:lumMod val="85000"/>
+              </a:schemeClr>
+            </a:solidFill>
+            <a:ln w="31750">
+              <a:solidFill>
+                <a:schemeClr val="bg1">
+                  <a:lumMod val="50000"/>
+                </a:schemeClr>
+              </a:solidFill>
+            </a:ln>
+          </p:spPr>
+          <p:style>
+            <a:lnRef idx="2">
+              <a:schemeClr val="accent1">
+                <a:shade val="50000"/>
+              </a:schemeClr>
+            </a:lnRef>
+            <a:fillRef idx="1">
+              <a:schemeClr val="accent1"/>
+            </a:fillRef>
+            <a:effectRef idx="0">
+              <a:schemeClr val="accent1"/>
+            </a:effectRef>
+            <a:fontRef idx="minor">
+              <a:schemeClr val="lt1"/>
+            </a:fontRef>
+          </p:style>
+          <p:txBody>
+            <a:bodyPr rtlCol="0" anchor="ctr"/>
+            <a:lstStyle/>
+            <a:p>
+              <a:pPr algn="ctr"/>
+              <a:r>
+                <a:rPr lang="en-US" sz="2000" dirty="0" err="1">
+                  <a:solidFill>
+                    <a:schemeClr val="tx1"/>
+                  </a:solidFill>
+                </a:rPr>
+                <a:t>Prototypenfeld</a:t>
+              </a:r>
+              <a:endParaRPr lang="de-DE" dirty="0">
+                <a:solidFill>
+                  <a:schemeClr val="tx1"/>
+                </a:solidFill>
+              </a:endParaRPr>
+            </a:p>
+          </p:txBody>
+        </p:sp>
+        <p:sp>
+          <p:nvSpPr>
+            <p:cNvPr id="30" name="Rechteck 29">
+              <a:extLst>
+                <a:ext uri="{FF2B5EF4-FFF2-40B4-BE49-F238E27FC236}">
+                  <a16:creationId xmlns:a16="http://schemas.microsoft.com/office/drawing/2014/main" id="{4C6B6415-A505-41C5-8E48-15F5EE3A1BF2}"/>
+                </a:ext>
+              </a:extLst>
+            </p:cNvPr>
+            <p:cNvSpPr/>
+            <p:nvPr/>
+          </p:nvSpPr>
+          <p:spPr>
+            <a:xfrm>
+              <a:off x="1976847" y="6119949"/>
+              <a:ext cx="2887295" cy="735874"/>
+            </a:xfrm>
+            <a:prstGeom prst="rect">
+              <a:avLst/>
+            </a:prstGeom>
+            <a:solidFill>
+              <a:schemeClr val="bg1">
+                <a:lumMod val="85000"/>
+              </a:schemeClr>
+            </a:solidFill>
+            <a:ln w="31750">
+              <a:solidFill>
+                <a:schemeClr val="bg1">
+                  <a:lumMod val="50000"/>
+                </a:schemeClr>
+              </a:solidFill>
+            </a:ln>
+          </p:spPr>
+          <p:style>
+            <a:lnRef idx="2">
+              <a:schemeClr val="accent1">
+                <a:shade val="50000"/>
+              </a:schemeClr>
+            </a:lnRef>
+            <a:fillRef idx="1">
+              <a:schemeClr val="accent1"/>
+            </a:fillRef>
+            <a:effectRef idx="0">
+              <a:schemeClr val="accent1"/>
+            </a:effectRef>
+            <a:fontRef idx="minor">
+              <a:schemeClr val="lt1"/>
+            </a:fontRef>
+          </p:style>
+          <p:txBody>
+            <a:bodyPr rtlCol="0" anchor="ctr"/>
+            <a:lstStyle/>
+            <a:p>
+              <a:pPr algn="ctr"/>
+              <a:r>
+                <a:rPr lang="en-US" sz="2000" dirty="0" err="1">
+                  <a:solidFill>
+                    <a:schemeClr val="tx1"/>
+                  </a:solidFill>
+                </a:rPr>
+                <a:t>Menü</a:t>
+              </a:r>
+              <a:endParaRPr lang="de-DE" dirty="0">
+                <a:solidFill>
+                  <a:schemeClr val="tx1"/>
+                </a:solidFill>
+              </a:endParaRPr>
+            </a:p>
+          </p:txBody>
+        </p:sp>
+      </p:grpSp>
+      <p:sp>
+        <p:nvSpPr>
+          <p:cNvPr id="31" name="Rechteck 30">
+            <a:extLst>
+              <a:ext uri="{FF2B5EF4-FFF2-40B4-BE49-F238E27FC236}">
+                <a16:creationId xmlns:a16="http://schemas.microsoft.com/office/drawing/2014/main" id="{8505DD1F-4346-420A-924D-2AA13AB4B616}"/>
+              </a:ext>
+            </a:extLst>
+          </p:cNvPr>
+          <p:cNvSpPr/>
+          <p:nvPr/>
+        </p:nvSpPr>
+        <p:spPr>
+          <a:xfrm>
+            <a:off x="0" y="6150430"/>
+            <a:ext cx="7751437" cy="731517"/>
+          </a:xfrm>
+          <a:prstGeom prst="rect">
+            <a:avLst/>
+          </a:prstGeom>
+          <a:solidFill>
+            <a:schemeClr val="bg1">
+              <a:alpha val="80000"/>
+            </a:schemeClr>
+          </a:solidFill>
+          <a:ln w="31750">
+            <a:noFill/>
+          </a:ln>
+        </p:spPr>
+        <p:style>
+          <a:lnRef idx="2">
+            <a:schemeClr val="accent1">
+              <a:shade val="50000"/>
+            </a:schemeClr>
+          </a:lnRef>
+          <a:fillRef idx="1">
+            <a:schemeClr val="accent1"/>
+          </a:fillRef>
+          <a:effectRef idx="0">
+            <a:schemeClr val="accent1"/>
+          </a:effectRef>
+          <a:fontRef idx="minor">
+            <a:schemeClr val="lt1"/>
+          </a:fontRef>
+        </p:style>
+        <p:txBody>
+          <a:bodyPr rtlCol="0" anchor="ctr"/>
+          <a:lstStyle/>
+          <a:p>
+            <a:pPr algn="ctr"/>
+            <a:endParaRPr lang="de-DE" dirty="0">
+              <a:solidFill>
+                <a:schemeClr val="tx1"/>
+              </a:solidFill>
+            </a:endParaRPr>
+          </a:p>
+        </p:txBody>
+      </p:sp>
+      <p:sp>
+        <p:nvSpPr>
+          <p:cNvPr id="32" name="Rechteck 31">
+            <a:extLst>
+              <a:ext uri="{FF2B5EF4-FFF2-40B4-BE49-F238E27FC236}">
+                <a16:creationId xmlns:a16="http://schemas.microsoft.com/office/drawing/2014/main" id="{3B042344-D63D-43BE-A957-B2A718B42F97}"/>
+              </a:ext>
+            </a:extLst>
+          </p:cNvPr>
+          <p:cNvSpPr/>
+          <p:nvPr/>
+        </p:nvSpPr>
+        <p:spPr>
+          <a:xfrm>
+            <a:off x="652598" y="2917923"/>
+            <a:ext cx="4470758" cy="936170"/>
+          </a:xfrm>
+          <a:prstGeom prst="rect">
+            <a:avLst/>
+          </a:prstGeom>
+          <a:solidFill>
+            <a:srgbClr val="FF0000">
+              <a:alpha val="85000"/>
+            </a:srgbClr>
+          </a:solidFill>
+          <a:ln w="57150">
+            <a:solidFill>
+              <a:srgbClr val="C00000"/>
+            </a:solidFill>
+          </a:ln>
+        </p:spPr>
+        <p:style>
+          <a:lnRef idx="2">
+            <a:schemeClr val="accent1">
+              <a:shade val="50000"/>
+            </a:schemeClr>
+          </a:lnRef>
+          <a:fillRef idx="1">
+            <a:schemeClr val="accent1"/>
+          </a:fillRef>
+          <a:effectRef idx="0">
+            <a:schemeClr val="accent1"/>
+          </a:effectRef>
+          <a:fontRef idx="minor">
+            <a:schemeClr val="lt1"/>
+          </a:fontRef>
+        </p:style>
+        <p:txBody>
+          <a:bodyPr rtlCol="0" anchor="ctr"/>
+          <a:lstStyle/>
+          <a:p>
+            <a:pPr algn="ctr"/>
+            <a:r>
+              <a:rPr lang="en-US" sz="2400" dirty="0" err="1">
+                <a:ln w="12700">
+                  <a:noFill/>
+                </a:ln>
+                <a:solidFill>
+                  <a:schemeClr val="bg1"/>
+                </a:solidFill>
+              </a:rPr>
+              <a:t>Prototypen</a:t>
+            </a:r>
+            <a:r>
+              <a:rPr lang="en-US" sz="2400" dirty="0">
+                <a:ln w="12700">
+                  <a:noFill/>
+                </a:ln>
+                <a:solidFill>
+                  <a:schemeClr val="bg1"/>
+                </a:solidFill>
+              </a:rPr>
+              <a:t> </a:t>
+            </a:r>
+            <a:r>
+              <a:rPr lang="en-US" sz="2400" dirty="0" err="1">
+                <a:ln w="12700">
+                  <a:noFill/>
+                </a:ln>
+                <a:solidFill>
+                  <a:schemeClr val="bg1"/>
+                </a:solidFill>
+              </a:rPr>
+              <a:t>instanzierbar</a:t>
+            </a:r>
+            <a:r>
+              <a:rPr lang="en-US" sz="2400" dirty="0">
+                <a:ln w="12700">
+                  <a:noFill/>
+                </a:ln>
+                <a:solidFill>
+                  <a:schemeClr val="bg1"/>
+                </a:solidFill>
+              </a:rPr>
+              <a:t> </a:t>
+            </a:r>
+            <a:r>
+              <a:rPr lang="en-US" sz="2400" dirty="0" err="1">
+                <a:ln w="12700">
+                  <a:noFill/>
+                </a:ln>
+                <a:solidFill>
+                  <a:schemeClr val="bg1"/>
+                </a:solidFill>
+              </a:rPr>
+              <a:t>machen</a:t>
+            </a:r>
+            <a:endParaRPr lang="de-DE" sz="2400" dirty="0">
+              <a:ln w="12700">
+                <a:noFill/>
+              </a:ln>
+              <a:solidFill>
+                <a:schemeClr val="bg1"/>
+              </a:solidFill>
+            </a:endParaRPr>
+          </a:p>
+        </p:txBody>
+      </p:sp>
+      <p:sp>
+        <p:nvSpPr>
+          <p:cNvPr id="33" name="Rechteck 32">
+            <a:extLst>
+              <a:ext uri="{FF2B5EF4-FFF2-40B4-BE49-F238E27FC236}">
+                <a16:creationId xmlns:a16="http://schemas.microsoft.com/office/drawing/2014/main" id="{53943DCF-24A1-4C1C-8B43-D51204A32CF3}"/>
+              </a:ext>
+            </a:extLst>
+          </p:cNvPr>
+          <p:cNvSpPr/>
+          <p:nvPr/>
+        </p:nvSpPr>
+        <p:spPr>
+          <a:xfrm>
+            <a:off x="652598" y="4281793"/>
+            <a:ext cx="4470758" cy="936170"/>
+          </a:xfrm>
+          <a:prstGeom prst="rect">
+            <a:avLst/>
+          </a:prstGeom>
+          <a:solidFill>
+            <a:srgbClr val="FF0000">
+              <a:alpha val="85000"/>
+            </a:srgbClr>
+          </a:solidFill>
+          <a:ln w="57150">
+            <a:solidFill>
+              <a:srgbClr val="C00000"/>
+            </a:solidFill>
+          </a:ln>
+        </p:spPr>
+        <p:style>
+          <a:lnRef idx="2">
+            <a:schemeClr val="accent1">
+              <a:shade val="50000"/>
+            </a:schemeClr>
+          </a:lnRef>
+          <a:fillRef idx="1">
+            <a:schemeClr val="accent1"/>
+          </a:fillRef>
+          <a:effectRef idx="0">
+            <a:schemeClr val="accent1"/>
+          </a:effectRef>
+          <a:fontRef idx="minor">
+            <a:schemeClr val="lt1"/>
+          </a:fontRef>
+        </p:style>
+        <p:txBody>
+          <a:bodyPr rtlCol="0" anchor="ctr"/>
+          <a:lstStyle/>
+          <a:p>
+            <a:pPr algn="ctr"/>
+            <a:r>
+              <a:rPr lang="en-US" sz="2400" dirty="0" err="1">
+                <a:ln w="12700">
+                  <a:noFill/>
+                </a:ln>
+                <a:solidFill>
+                  <a:schemeClr val="bg1"/>
+                </a:solidFill>
+              </a:rPr>
+              <a:t>Bausteineigenschaften</a:t>
+            </a:r>
+            <a:r>
+              <a:rPr lang="en-US" sz="2400" dirty="0">
+                <a:ln w="12700">
+                  <a:noFill/>
+                </a:ln>
+                <a:solidFill>
+                  <a:schemeClr val="bg1"/>
+                </a:solidFill>
+              </a:rPr>
+              <a:t> </a:t>
+            </a:r>
+            <a:r>
+              <a:rPr lang="en-US" sz="2400" dirty="0" err="1">
+                <a:ln w="12700">
+                  <a:noFill/>
+                </a:ln>
+                <a:solidFill>
+                  <a:schemeClr val="bg1"/>
+                </a:solidFill>
+              </a:rPr>
+              <a:t>bearbeitbar</a:t>
+            </a:r>
+            <a:r>
+              <a:rPr lang="en-US" sz="2400" dirty="0">
+                <a:ln w="12700">
+                  <a:noFill/>
+                </a:ln>
+                <a:solidFill>
+                  <a:schemeClr val="bg1"/>
+                </a:solidFill>
+              </a:rPr>
+              <a:t> </a:t>
+            </a:r>
+            <a:r>
+              <a:rPr lang="en-US" sz="2400" dirty="0" err="1">
+                <a:ln w="12700">
+                  <a:noFill/>
+                </a:ln>
+                <a:solidFill>
+                  <a:schemeClr val="bg1"/>
+                </a:solidFill>
+              </a:rPr>
+              <a:t>machen</a:t>
+            </a:r>
+            <a:endParaRPr lang="de-DE" sz="2400" dirty="0">
+              <a:ln w="12700">
+                <a:noFill/>
+              </a:ln>
+              <a:solidFill>
+                <a:schemeClr val="bg1"/>
+              </a:solidFill>
+            </a:endParaRPr>
+          </a:p>
+        </p:txBody>
+      </p:sp>
     </p:spTree>
     <p:extLst>
       <p:ext uri="{BB962C8B-B14F-4D97-AF65-F5344CB8AC3E}">
-        <p14:creationId xmlns:p14="http://schemas.microsoft.com/office/powerpoint/2010/main" val="367192819"/>
+        <p14:creationId xmlns:p14="http://schemas.microsoft.com/office/powerpoint/2010/main" val="2362859845"/>
       </p:ext>
     </p:extLst>
   </p:cSld>

</xml_diff>